<commit_message>
update: game mechanism diagram
</commit_message>
<xml_diff>
--- a/SRS.pptx
+++ b/SRS.pptx
@@ -353,7 +353,7 @@
           <a:p>
             <a:fld id="{B0AAE9EB-4E09-49F4-B23B-25A5BA76B78B}" type="datetimeFigureOut">
               <a:rPr lang="en-IN" smtClean="0"/>
-              <a:t>04-04-2024</a:t>
+              <a:t>14-04-2024</a:t>
             </a:fld>
             <a:endParaRPr lang="en-IN"/>
           </a:p>
@@ -553,7 +553,7 @@
           <a:p>
             <a:fld id="{B0AAE9EB-4E09-49F4-B23B-25A5BA76B78B}" type="datetimeFigureOut">
               <a:rPr lang="en-IN" smtClean="0"/>
-              <a:t>04-04-2024</a:t>
+              <a:t>14-04-2024</a:t>
             </a:fld>
             <a:endParaRPr lang="en-IN"/>
           </a:p>
@@ -763,7 +763,7 @@
           <a:p>
             <a:fld id="{B0AAE9EB-4E09-49F4-B23B-25A5BA76B78B}" type="datetimeFigureOut">
               <a:rPr lang="en-IN" smtClean="0"/>
-              <a:t>04-04-2024</a:t>
+              <a:t>14-04-2024</a:t>
             </a:fld>
             <a:endParaRPr lang="en-IN"/>
           </a:p>
@@ -963,7 +963,7 @@
           <a:p>
             <a:fld id="{B0AAE9EB-4E09-49F4-B23B-25A5BA76B78B}" type="datetimeFigureOut">
               <a:rPr lang="en-IN" smtClean="0"/>
-              <a:t>04-04-2024</a:t>
+              <a:t>14-04-2024</a:t>
             </a:fld>
             <a:endParaRPr lang="en-IN"/>
           </a:p>
@@ -1239,7 +1239,7 @@
           <a:p>
             <a:fld id="{B0AAE9EB-4E09-49F4-B23B-25A5BA76B78B}" type="datetimeFigureOut">
               <a:rPr lang="en-IN" smtClean="0"/>
-              <a:t>04-04-2024</a:t>
+              <a:t>14-04-2024</a:t>
             </a:fld>
             <a:endParaRPr lang="en-IN"/>
           </a:p>
@@ -1507,7 +1507,7 @@
           <a:p>
             <a:fld id="{B0AAE9EB-4E09-49F4-B23B-25A5BA76B78B}" type="datetimeFigureOut">
               <a:rPr lang="en-IN" smtClean="0"/>
-              <a:t>04-04-2024</a:t>
+              <a:t>14-04-2024</a:t>
             </a:fld>
             <a:endParaRPr lang="en-IN"/>
           </a:p>
@@ -1922,7 +1922,7 @@
           <a:p>
             <a:fld id="{B0AAE9EB-4E09-49F4-B23B-25A5BA76B78B}" type="datetimeFigureOut">
               <a:rPr lang="en-IN" smtClean="0"/>
-              <a:t>04-04-2024</a:t>
+              <a:t>14-04-2024</a:t>
             </a:fld>
             <a:endParaRPr lang="en-IN"/>
           </a:p>
@@ -2064,7 +2064,7 @@
           <a:p>
             <a:fld id="{B0AAE9EB-4E09-49F4-B23B-25A5BA76B78B}" type="datetimeFigureOut">
               <a:rPr lang="en-IN" smtClean="0"/>
-              <a:t>04-04-2024</a:t>
+              <a:t>14-04-2024</a:t>
             </a:fld>
             <a:endParaRPr lang="en-IN"/>
           </a:p>
@@ -2177,7 +2177,7 @@
           <a:p>
             <a:fld id="{B0AAE9EB-4E09-49F4-B23B-25A5BA76B78B}" type="datetimeFigureOut">
               <a:rPr lang="en-IN" smtClean="0"/>
-              <a:t>04-04-2024</a:t>
+              <a:t>14-04-2024</a:t>
             </a:fld>
             <a:endParaRPr lang="en-IN"/>
           </a:p>
@@ -2490,7 +2490,7 @@
           <a:p>
             <a:fld id="{B0AAE9EB-4E09-49F4-B23B-25A5BA76B78B}" type="datetimeFigureOut">
               <a:rPr lang="en-IN" smtClean="0"/>
-              <a:t>04-04-2024</a:t>
+              <a:t>14-04-2024</a:t>
             </a:fld>
             <a:endParaRPr lang="en-IN"/>
           </a:p>
@@ -2779,7 +2779,7 @@
           <a:p>
             <a:fld id="{B0AAE9EB-4E09-49F4-B23B-25A5BA76B78B}" type="datetimeFigureOut">
               <a:rPr lang="en-IN" smtClean="0"/>
-              <a:t>04-04-2024</a:t>
+              <a:t>14-04-2024</a:t>
             </a:fld>
             <a:endParaRPr lang="en-IN"/>
           </a:p>
@@ -3022,7 +3022,7 @@
           <a:p>
             <a:fld id="{B0AAE9EB-4E09-49F4-B23B-25A5BA76B78B}" type="datetimeFigureOut">
               <a:rPr lang="en-IN" smtClean="0"/>
-              <a:t>04-04-2024</a:t>
+              <a:t>14-04-2024</a:t>
             </a:fld>
             <a:endParaRPr lang="en-IN"/>
           </a:p>
@@ -5911,7 +5911,7 @@
         </p:nvSpPr>
         <p:spPr>
           <a:xfrm>
-            <a:off x="7819018" y="2544649"/>
+            <a:off x="7810549" y="2631207"/>
             <a:ext cx="2142699" cy="655092"/>
           </a:xfrm>
           <a:prstGeom prst="roundRect">
@@ -6357,9 +6357,9 @@
           <p:nvPr/>
         </p:nvCxnSpPr>
         <p:spPr>
-          <a:xfrm flipH="1">
-            <a:off x="8890367" y="3199741"/>
-            <a:ext cx="1" cy="493368"/>
+          <a:xfrm>
+            <a:off x="8881899" y="3286299"/>
+            <a:ext cx="8468" cy="406810"/>
           </a:xfrm>
           <a:prstGeom prst="straightConnector1">
             <a:avLst/>
@@ -6400,8 +6400,8 @@
         </p:nvSpPr>
         <p:spPr>
           <a:xfrm>
-            <a:off x="6607455" y="3687214"/>
-            <a:ext cx="831574" cy="338554"/>
+            <a:off x="6975338" y="3704955"/>
+            <a:ext cx="442750" cy="338554"/>
           </a:xfrm>
           <a:prstGeom prst="rect">
             <a:avLst/>
@@ -6416,7 +6416,7 @@
           <a:p>
             <a:r>
               <a:rPr lang="en-US" sz="1600" dirty="0"/>
-              <a:t>if failed</a:t>
+              <a:t>No</a:t>
             </a:r>
             <a:endParaRPr lang="en-IN" sz="1600" dirty="0"/>
           </a:p>
@@ -6507,9 +6507,9 @@
           <p:nvPr/>
         </p:nvCxnSpPr>
         <p:spPr>
-          <a:xfrm rot="16200000" flipH="1">
-            <a:off x="8683003" y="2337284"/>
-            <a:ext cx="406262" cy="8468"/>
+          <a:xfrm rot="5400000">
+            <a:off x="8635490" y="2384797"/>
+            <a:ext cx="492820" cy="1"/>
           </a:xfrm>
           <a:prstGeom prst="bentConnector3">
             <a:avLst>
@@ -6655,6 +6655,172 @@
           </a:fontRef>
         </p:style>
       </p:cxnSp>
+      <p:cxnSp>
+        <p:nvCxnSpPr>
+          <p:cNvPr id="6" name="Connector: Elbow 5">
+            <a:extLst>
+              <a:ext uri="{FF2B5EF4-FFF2-40B4-BE49-F238E27FC236}">
+                <a16:creationId xmlns:a16="http://schemas.microsoft.com/office/drawing/2014/main" id="{934781F5-E433-3ADA-0D93-1236AABD07BF}"/>
+              </a:ext>
+            </a:extLst>
+          </p:cNvPr>
+          <p:cNvCxnSpPr>
+            <a:cxnSpLocks/>
+            <a:stCxn id="44" idx="2"/>
+            <a:endCxn id="14" idx="1"/>
+          </p:cNvCxnSpPr>
+          <p:nvPr/>
+        </p:nvCxnSpPr>
+        <p:spPr>
+          <a:xfrm rot="16200000" flipH="1">
+            <a:off x="6410490" y="1558693"/>
+            <a:ext cx="156111" cy="2644007"/>
+          </a:xfrm>
+          <a:prstGeom prst="bentConnector2">
+            <a:avLst/>
+          </a:prstGeom>
+          <a:ln w="38100">
+            <a:solidFill>
+              <a:srgbClr val="DBB986"/>
+            </a:solidFill>
+            <a:prstDash val="sysDash"/>
+            <a:tailEnd type="triangle"/>
+          </a:ln>
+        </p:spPr>
+        <p:style>
+          <a:lnRef idx="2">
+            <a:schemeClr val="accent1"/>
+          </a:lnRef>
+          <a:fillRef idx="0">
+            <a:schemeClr val="accent1"/>
+          </a:fillRef>
+          <a:effectRef idx="1">
+            <a:schemeClr val="accent1"/>
+          </a:effectRef>
+          <a:fontRef idx="minor">
+            <a:schemeClr val="tx1"/>
+          </a:fontRef>
+        </p:style>
+      </p:cxnSp>
+      <p:cxnSp>
+        <p:nvCxnSpPr>
+          <p:cNvPr id="19" name="Connector: Elbow 18">
+            <a:extLst>
+              <a:ext uri="{FF2B5EF4-FFF2-40B4-BE49-F238E27FC236}">
+                <a16:creationId xmlns:a16="http://schemas.microsoft.com/office/drawing/2014/main" id="{3CB719F6-41A0-FF7E-1E98-2963AED8EF38}"/>
+              </a:ext>
+            </a:extLst>
+          </p:cNvPr>
+          <p:cNvCxnSpPr>
+            <a:stCxn id="15" idx="3"/>
+            <a:endCxn id="13" idx="1"/>
+          </p:cNvCxnSpPr>
+          <p:nvPr/>
+        </p:nvCxnSpPr>
+        <p:spPr>
+          <a:xfrm flipV="1">
+            <a:off x="6239093" y="1810841"/>
+            <a:ext cx="1571457" cy="2203919"/>
+          </a:xfrm>
+          <a:prstGeom prst="bentConnector3">
+            <a:avLst>
+              <a:gd name="adj1" fmla="val 26551"/>
+            </a:avLst>
+          </a:prstGeom>
+          <a:ln w="38100">
+            <a:solidFill>
+              <a:srgbClr val="DBB986"/>
+            </a:solidFill>
+            <a:tailEnd type="triangle"/>
+          </a:ln>
+        </p:spPr>
+        <p:style>
+          <a:lnRef idx="2">
+            <a:schemeClr val="accent1"/>
+          </a:lnRef>
+          <a:fillRef idx="0">
+            <a:schemeClr val="accent1"/>
+          </a:fillRef>
+          <a:effectRef idx="1">
+            <a:schemeClr val="accent1"/>
+          </a:effectRef>
+          <a:fontRef idx="minor">
+            <a:schemeClr val="tx1"/>
+          </a:fontRef>
+        </p:style>
+      </p:cxnSp>
+      <p:sp>
+        <p:nvSpPr>
+          <p:cNvPr id="23" name="TextBox 22">
+            <a:extLst>
+              <a:ext uri="{FF2B5EF4-FFF2-40B4-BE49-F238E27FC236}">
+                <a16:creationId xmlns:a16="http://schemas.microsoft.com/office/drawing/2014/main" id="{2FB4AE45-DF7A-270B-91A3-F4D5A7030123}"/>
+              </a:ext>
+            </a:extLst>
+          </p:cNvPr>
+          <p:cNvSpPr txBox="1"/>
+          <p:nvPr/>
+        </p:nvSpPr>
+        <p:spPr>
+          <a:xfrm rot="16200000">
+            <a:off x="6262004" y="3257664"/>
+            <a:ext cx="487762" cy="338554"/>
+          </a:xfrm>
+          <a:prstGeom prst="rect">
+            <a:avLst/>
+          </a:prstGeom>
+          <a:noFill/>
+        </p:spPr>
+        <p:txBody>
+          <a:bodyPr wrap="none" rtlCol="0">
+            <a:spAutoFit/>
+          </a:bodyPr>
+          <a:lstStyle/>
+          <a:p>
+            <a:r>
+              <a:rPr lang="en-US" sz="1600" dirty="0"/>
+              <a:t>Yes</a:t>
+            </a:r>
+            <a:endParaRPr lang="en-IN" sz="1600" dirty="0"/>
+          </a:p>
+        </p:txBody>
+      </p:sp>
+      <p:sp>
+        <p:nvSpPr>
+          <p:cNvPr id="24" name="TextBox 23">
+            <a:extLst>
+              <a:ext uri="{FF2B5EF4-FFF2-40B4-BE49-F238E27FC236}">
+                <a16:creationId xmlns:a16="http://schemas.microsoft.com/office/drawing/2014/main" id="{EB397EE5-BAC7-4E32-E008-EA7BA3DD854A}"/>
+              </a:ext>
+            </a:extLst>
+          </p:cNvPr>
+          <p:cNvSpPr txBox="1"/>
+          <p:nvPr/>
+        </p:nvSpPr>
+        <p:spPr>
+          <a:xfrm>
+            <a:off x="7023242" y="2643553"/>
+            <a:ext cx="442750" cy="338554"/>
+          </a:xfrm>
+          <a:prstGeom prst="rect">
+            <a:avLst/>
+          </a:prstGeom>
+          <a:noFill/>
+        </p:spPr>
+        <p:txBody>
+          <a:bodyPr wrap="none" rtlCol="0">
+            <a:spAutoFit/>
+          </a:bodyPr>
+          <a:lstStyle/>
+          <a:p>
+            <a:r>
+              <a:rPr lang="en-US" sz="1600" dirty="0"/>
+              <a:t>No</a:t>
+            </a:r>
+            <a:endParaRPr lang="en-IN" sz="1600" dirty="0"/>
+          </a:p>
+        </p:txBody>
+      </p:sp>
     </p:spTree>
     <p:extLst>
       <p:ext uri="{BB962C8B-B14F-4D97-AF65-F5344CB8AC3E}">

</xml_diff>

<commit_message>
new: gamepad & mainmenu illustration
</commit_message>
<xml_diff>
--- a/SRS.pptx
+++ b/SRS.pptx
@@ -4,6 +4,9 @@
   <p:sldMasterIdLst>
     <p:sldMasterId id="2147483648" r:id="rId1"/>
   </p:sldMasterIdLst>
+  <p:notesMasterIdLst>
+    <p:notesMasterId r:id="rId26"/>
+  </p:notesMasterIdLst>
   <p:sldIdLst>
     <p:sldId id="256" r:id="rId2"/>
     <p:sldId id="257" r:id="rId3"/>
@@ -25,6 +28,10 @@
     <p:sldId id="274" r:id="rId19"/>
     <p:sldId id="259" r:id="rId20"/>
     <p:sldId id="275" r:id="rId21"/>
+    <p:sldId id="277" r:id="rId22"/>
+    <p:sldId id="276" r:id="rId23"/>
+    <p:sldId id="278" r:id="rId24"/>
+    <p:sldId id="279" r:id="rId25"/>
   </p:sldIdLst>
   <p:sldSz cx="12192000" cy="6858000"/>
   <p:notesSz cx="6858000" cy="9144000"/>
@@ -226,6 +233,440 @@
 </inkml:ink>
 </file>
 
+<file path=ppt/notesMasters/notesMaster1.xml><?xml version="1.0" encoding="utf-8"?>
+<p:notesMaster xmlns:a="http://schemas.openxmlformats.org/drawingml/2006/main" xmlns:r="http://schemas.openxmlformats.org/officeDocument/2006/relationships" xmlns:p="http://schemas.openxmlformats.org/presentationml/2006/main">
+  <p:cSld>
+    <p:bg>
+      <p:bgRef idx="1001">
+        <a:schemeClr val="bg1"/>
+      </p:bgRef>
+    </p:bg>
+    <p:spTree>
+      <p:nvGrpSpPr>
+        <p:cNvPr id="1" name=""/>
+        <p:cNvGrpSpPr/>
+        <p:nvPr/>
+      </p:nvGrpSpPr>
+      <p:grpSpPr>
+        <a:xfrm>
+          <a:off x="0" y="0"/>
+          <a:ext cx="0" cy="0"/>
+          <a:chOff x="0" y="0"/>
+          <a:chExt cx="0" cy="0"/>
+        </a:xfrm>
+      </p:grpSpPr>
+      <p:sp>
+        <p:nvSpPr>
+          <p:cNvPr id="2" name="Header Placeholder 1"/>
+          <p:cNvSpPr>
+            <a:spLocks noGrp="1"/>
+          </p:cNvSpPr>
+          <p:nvPr>
+            <p:ph type="hdr" sz="quarter"/>
+          </p:nvPr>
+        </p:nvSpPr>
+        <p:spPr>
+          <a:xfrm>
+            <a:off x="0" y="0"/>
+            <a:ext cx="2971800" cy="458788"/>
+          </a:xfrm>
+          <a:prstGeom prst="rect">
+            <a:avLst/>
+          </a:prstGeom>
+        </p:spPr>
+        <p:txBody>
+          <a:bodyPr vert="horz" lIns="91440" tIns="45720" rIns="91440" bIns="45720" rtlCol="0"/>
+          <a:lstStyle>
+            <a:lvl1pPr algn="l">
+              <a:defRPr sz="1200"/>
+            </a:lvl1pPr>
+          </a:lstStyle>
+          <a:p>
+            <a:endParaRPr lang="en-IN"/>
+          </a:p>
+        </p:txBody>
+      </p:sp>
+      <p:sp>
+        <p:nvSpPr>
+          <p:cNvPr id="3" name="Date Placeholder 2"/>
+          <p:cNvSpPr>
+            <a:spLocks noGrp="1"/>
+          </p:cNvSpPr>
+          <p:nvPr>
+            <p:ph type="dt" idx="1"/>
+          </p:nvPr>
+        </p:nvSpPr>
+        <p:spPr>
+          <a:xfrm>
+            <a:off x="3884613" y="0"/>
+            <a:ext cx="2971800" cy="458788"/>
+          </a:xfrm>
+          <a:prstGeom prst="rect">
+            <a:avLst/>
+          </a:prstGeom>
+        </p:spPr>
+        <p:txBody>
+          <a:bodyPr vert="horz" lIns="91440" tIns="45720" rIns="91440" bIns="45720" rtlCol="0"/>
+          <a:lstStyle>
+            <a:lvl1pPr algn="r">
+              <a:defRPr sz="1200"/>
+            </a:lvl1pPr>
+          </a:lstStyle>
+          <a:p>
+            <a:fld id="{CEAC4AD2-EC9B-44A1-B6A9-104282B0C1D3}" type="datetimeFigureOut">
+              <a:rPr lang="en-IN" smtClean="0"/>
+              <a:t>03-05-2024</a:t>
+            </a:fld>
+            <a:endParaRPr lang="en-IN"/>
+          </a:p>
+        </p:txBody>
+      </p:sp>
+      <p:sp>
+        <p:nvSpPr>
+          <p:cNvPr id="4" name="Slide Image Placeholder 3"/>
+          <p:cNvSpPr>
+            <a:spLocks noGrp="1" noRot="1" noChangeAspect="1"/>
+          </p:cNvSpPr>
+          <p:nvPr>
+            <p:ph type="sldImg" idx="2"/>
+          </p:nvPr>
+        </p:nvSpPr>
+        <p:spPr>
+          <a:xfrm>
+            <a:off x="685800" y="1143000"/>
+            <a:ext cx="5486400" cy="3086100"/>
+          </a:xfrm>
+          <a:prstGeom prst="rect">
+            <a:avLst/>
+          </a:prstGeom>
+          <a:noFill/>
+          <a:ln w="12700">
+            <a:solidFill>
+              <a:prstClr val="black"/>
+            </a:solidFill>
+          </a:ln>
+        </p:spPr>
+        <p:txBody>
+          <a:bodyPr vert="horz" lIns="91440" tIns="45720" rIns="91440" bIns="45720" rtlCol="0" anchor="ctr"/>
+          <a:lstStyle/>
+          <a:p>
+            <a:endParaRPr lang="en-IN"/>
+          </a:p>
+        </p:txBody>
+      </p:sp>
+      <p:sp>
+        <p:nvSpPr>
+          <p:cNvPr id="5" name="Notes Placeholder 4"/>
+          <p:cNvSpPr>
+            <a:spLocks noGrp="1"/>
+          </p:cNvSpPr>
+          <p:nvPr>
+            <p:ph type="body" sz="quarter" idx="3"/>
+          </p:nvPr>
+        </p:nvSpPr>
+        <p:spPr>
+          <a:xfrm>
+            <a:off x="685800" y="4400550"/>
+            <a:ext cx="5486400" cy="3600450"/>
+          </a:xfrm>
+          <a:prstGeom prst="rect">
+            <a:avLst/>
+          </a:prstGeom>
+        </p:spPr>
+        <p:txBody>
+          <a:bodyPr vert="horz" lIns="91440" tIns="45720" rIns="91440" bIns="45720" rtlCol="0"/>
+          <a:lstStyle/>
+          <a:p>
+            <a:pPr lvl="0"/>
+            <a:r>
+              <a:rPr lang="en-US"/>
+              <a:t>Click to edit Master text styles</a:t>
+            </a:r>
+          </a:p>
+          <a:p>
+            <a:pPr lvl="1"/>
+            <a:r>
+              <a:rPr lang="en-US"/>
+              <a:t>Second level</a:t>
+            </a:r>
+          </a:p>
+          <a:p>
+            <a:pPr lvl="2"/>
+            <a:r>
+              <a:rPr lang="en-US"/>
+              <a:t>Third level</a:t>
+            </a:r>
+          </a:p>
+          <a:p>
+            <a:pPr lvl="3"/>
+            <a:r>
+              <a:rPr lang="en-US"/>
+              <a:t>Fourth level</a:t>
+            </a:r>
+          </a:p>
+          <a:p>
+            <a:pPr lvl="4"/>
+            <a:r>
+              <a:rPr lang="en-US"/>
+              <a:t>Fifth level</a:t>
+            </a:r>
+            <a:endParaRPr lang="en-IN"/>
+          </a:p>
+        </p:txBody>
+      </p:sp>
+      <p:sp>
+        <p:nvSpPr>
+          <p:cNvPr id="6" name="Footer Placeholder 5"/>
+          <p:cNvSpPr>
+            <a:spLocks noGrp="1"/>
+          </p:cNvSpPr>
+          <p:nvPr>
+            <p:ph type="ftr" sz="quarter" idx="4"/>
+          </p:nvPr>
+        </p:nvSpPr>
+        <p:spPr>
+          <a:xfrm>
+            <a:off x="0" y="8685213"/>
+            <a:ext cx="2971800" cy="458787"/>
+          </a:xfrm>
+          <a:prstGeom prst="rect">
+            <a:avLst/>
+          </a:prstGeom>
+        </p:spPr>
+        <p:txBody>
+          <a:bodyPr vert="horz" lIns="91440" tIns="45720" rIns="91440" bIns="45720" rtlCol="0" anchor="b"/>
+          <a:lstStyle>
+            <a:lvl1pPr algn="l">
+              <a:defRPr sz="1200"/>
+            </a:lvl1pPr>
+          </a:lstStyle>
+          <a:p>
+            <a:endParaRPr lang="en-IN"/>
+          </a:p>
+        </p:txBody>
+      </p:sp>
+      <p:sp>
+        <p:nvSpPr>
+          <p:cNvPr id="7" name="Slide Number Placeholder 6"/>
+          <p:cNvSpPr>
+            <a:spLocks noGrp="1"/>
+          </p:cNvSpPr>
+          <p:nvPr>
+            <p:ph type="sldNum" sz="quarter" idx="5"/>
+          </p:nvPr>
+        </p:nvSpPr>
+        <p:spPr>
+          <a:xfrm>
+            <a:off x="3884613" y="8685213"/>
+            <a:ext cx="2971800" cy="458787"/>
+          </a:xfrm>
+          <a:prstGeom prst="rect">
+            <a:avLst/>
+          </a:prstGeom>
+        </p:spPr>
+        <p:txBody>
+          <a:bodyPr vert="horz" lIns="91440" tIns="45720" rIns="91440" bIns="45720" rtlCol="0" anchor="b"/>
+          <a:lstStyle>
+            <a:lvl1pPr algn="r">
+              <a:defRPr sz="1200"/>
+            </a:lvl1pPr>
+          </a:lstStyle>
+          <a:p>
+            <a:fld id="{5CC35FC0-E292-40B0-B651-7CB180ABF71B}" type="slidenum">
+              <a:rPr lang="en-IN" smtClean="0"/>
+              <a:t>‹#›</a:t>
+            </a:fld>
+            <a:endParaRPr lang="en-IN"/>
+          </a:p>
+        </p:txBody>
+      </p:sp>
+    </p:spTree>
+    <p:extLst>
+      <p:ext uri="{BB962C8B-B14F-4D97-AF65-F5344CB8AC3E}">
+        <p14:creationId xmlns:p14="http://schemas.microsoft.com/office/powerpoint/2010/main" val="1941560128"/>
+      </p:ext>
+    </p:extLst>
+  </p:cSld>
+  <p:clrMap bg1="lt1" tx1="dk1" bg2="lt2" tx2="dk2" accent1="accent1" accent2="accent2" accent3="accent3" accent4="accent4" accent5="accent5" accent6="accent6" hlink="hlink" folHlink="folHlink"/>
+  <p:notesStyle>
+    <a:lvl1pPr marL="0" algn="l" defTabSz="914400" rtl="0" eaLnBrk="1" latinLnBrk="0" hangingPunct="1">
+      <a:defRPr sz="1200" kern="1200">
+        <a:solidFill>
+          <a:schemeClr val="tx1"/>
+        </a:solidFill>
+        <a:latin typeface="+mn-lt"/>
+        <a:ea typeface="+mn-ea"/>
+        <a:cs typeface="+mn-cs"/>
+      </a:defRPr>
+    </a:lvl1pPr>
+    <a:lvl2pPr marL="457200" algn="l" defTabSz="914400" rtl="0" eaLnBrk="1" latinLnBrk="0" hangingPunct="1">
+      <a:defRPr sz="1200" kern="1200">
+        <a:solidFill>
+          <a:schemeClr val="tx1"/>
+        </a:solidFill>
+        <a:latin typeface="+mn-lt"/>
+        <a:ea typeface="+mn-ea"/>
+        <a:cs typeface="+mn-cs"/>
+      </a:defRPr>
+    </a:lvl2pPr>
+    <a:lvl3pPr marL="914400" algn="l" defTabSz="914400" rtl="0" eaLnBrk="1" latinLnBrk="0" hangingPunct="1">
+      <a:defRPr sz="1200" kern="1200">
+        <a:solidFill>
+          <a:schemeClr val="tx1"/>
+        </a:solidFill>
+        <a:latin typeface="+mn-lt"/>
+        <a:ea typeface="+mn-ea"/>
+        <a:cs typeface="+mn-cs"/>
+      </a:defRPr>
+    </a:lvl3pPr>
+    <a:lvl4pPr marL="1371600" algn="l" defTabSz="914400" rtl="0" eaLnBrk="1" latinLnBrk="0" hangingPunct="1">
+      <a:defRPr sz="1200" kern="1200">
+        <a:solidFill>
+          <a:schemeClr val="tx1"/>
+        </a:solidFill>
+        <a:latin typeface="+mn-lt"/>
+        <a:ea typeface="+mn-ea"/>
+        <a:cs typeface="+mn-cs"/>
+      </a:defRPr>
+    </a:lvl4pPr>
+    <a:lvl5pPr marL="1828800" algn="l" defTabSz="914400" rtl="0" eaLnBrk="1" latinLnBrk="0" hangingPunct="1">
+      <a:defRPr sz="1200" kern="1200">
+        <a:solidFill>
+          <a:schemeClr val="tx1"/>
+        </a:solidFill>
+        <a:latin typeface="+mn-lt"/>
+        <a:ea typeface="+mn-ea"/>
+        <a:cs typeface="+mn-cs"/>
+      </a:defRPr>
+    </a:lvl5pPr>
+    <a:lvl6pPr marL="2286000" algn="l" defTabSz="914400" rtl="0" eaLnBrk="1" latinLnBrk="0" hangingPunct="1">
+      <a:defRPr sz="1200" kern="1200">
+        <a:solidFill>
+          <a:schemeClr val="tx1"/>
+        </a:solidFill>
+        <a:latin typeface="+mn-lt"/>
+        <a:ea typeface="+mn-ea"/>
+        <a:cs typeface="+mn-cs"/>
+      </a:defRPr>
+    </a:lvl6pPr>
+    <a:lvl7pPr marL="2743200" algn="l" defTabSz="914400" rtl="0" eaLnBrk="1" latinLnBrk="0" hangingPunct="1">
+      <a:defRPr sz="1200" kern="1200">
+        <a:solidFill>
+          <a:schemeClr val="tx1"/>
+        </a:solidFill>
+        <a:latin typeface="+mn-lt"/>
+        <a:ea typeface="+mn-ea"/>
+        <a:cs typeface="+mn-cs"/>
+      </a:defRPr>
+    </a:lvl7pPr>
+    <a:lvl8pPr marL="3200400" algn="l" defTabSz="914400" rtl="0" eaLnBrk="1" latinLnBrk="0" hangingPunct="1">
+      <a:defRPr sz="1200" kern="1200">
+        <a:solidFill>
+          <a:schemeClr val="tx1"/>
+        </a:solidFill>
+        <a:latin typeface="+mn-lt"/>
+        <a:ea typeface="+mn-ea"/>
+        <a:cs typeface="+mn-cs"/>
+      </a:defRPr>
+    </a:lvl8pPr>
+    <a:lvl9pPr marL="3657600" algn="l" defTabSz="914400" rtl="0" eaLnBrk="1" latinLnBrk="0" hangingPunct="1">
+      <a:defRPr sz="1200" kern="1200">
+        <a:solidFill>
+          <a:schemeClr val="tx1"/>
+        </a:solidFill>
+        <a:latin typeface="+mn-lt"/>
+        <a:ea typeface="+mn-ea"/>
+        <a:cs typeface="+mn-cs"/>
+      </a:defRPr>
+    </a:lvl9pPr>
+  </p:notesStyle>
+</p:notesMaster>
+</file>
+
+<file path=ppt/notesSlides/notesSlide1.xml><?xml version="1.0" encoding="utf-8"?>
+<p:notes xmlns:a="http://schemas.openxmlformats.org/drawingml/2006/main" xmlns:r="http://schemas.openxmlformats.org/officeDocument/2006/relationships" xmlns:p="http://schemas.openxmlformats.org/presentationml/2006/main">
+  <p:cSld>
+    <p:spTree>
+      <p:nvGrpSpPr>
+        <p:cNvPr id="1" name=""/>
+        <p:cNvGrpSpPr/>
+        <p:nvPr/>
+      </p:nvGrpSpPr>
+      <p:grpSpPr>
+        <a:xfrm>
+          <a:off x="0" y="0"/>
+          <a:ext cx="0" cy="0"/>
+          <a:chOff x="0" y="0"/>
+          <a:chExt cx="0" cy="0"/>
+        </a:xfrm>
+      </p:grpSpPr>
+      <p:sp>
+        <p:nvSpPr>
+          <p:cNvPr id="2" name="Slide Image Placeholder 1"/>
+          <p:cNvSpPr>
+            <a:spLocks noGrp="1" noRot="1" noChangeAspect="1"/>
+          </p:cNvSpPr>
+          <p:nvPr>
+            <p:ph type="sldImg"/>
+          </p:nvPr>
+        </p:nvSpPr>
+        <p:spPr/>
+      </p:sp>
+      <p:sp>
+        <p:nvSpPr>
+          <p:cNvPr id="3" name="Notes Placeholder 2"/>
+          <p:cNvSpPr>
+            <a:spLocks noGrp="1"/>
+          </p:cNvSpPr>
+          <p:nvPr>
+            <p:ph type="body" idx="1"/>
+          </p:nvPr>
+        </p:nvSpPr>
+        <p:spPr/>
+        <p:txBody>
+          <a:bodyPr/>
+          <a:lstStyle/>
+          <a:p>
+            <a:endParaRPr lang="en-IN" dirty="0"/>
+          </a:p>
+        </p:txBody>
+      </p:sp>
+      <p:sp>
+        <p:nvSpPr>
+          <p:cNvPr id="4" name="Slide Number Placeholder 3"/>
+          <p:cNvSpPr>
+            <a:spLocks noGrp="1"/>
+          </p:cNvSpPr>
+          <p:nvPr>
+            <p:ph type="sldNum" sz="quarter" idx="5"/>
+          </p:nvPr>
+        </p:nvSpPr>
+        <p:spPr/>
+        <p:txBody>
+          <a:bodyPr/>
+          <a:lstStyle/>
+          <a:p>
+            <a:fld id="{5CC35FC0-E292-40B0-B651-7CB180ABF71B}" type="slidenum">
+              <a:rPr lang="en-IN" smtClean="0"/>
+              <a:t>23</a:t>
+            </a:fld>
+            <a:endParaRPr lang="en-IN"/>
+          </a:p>
+        </p:txBody>
+      </p:sp>
+    </p:spTree>
+    <p:extLst>
+      <p:ext uri="{BB962C8B-B14F-4D97-AF65-F5344CB8AC3E}">
+        <p14:creationId xmlns:p14="http://schemas.microsoft.com/office/powerpoint/2010/main" val="1298355115"/>
+      </p:ext>
+    </p:extLst>
+  </p:cSld>
+  <p:clrMapOvr>
+    <a:masterClrMapping/>
+  </p:clrMapOvr>
+</p:notes>
+</file>
+
 <file path=ppt/slideLayouts/slideLayout1.xml><?xml version="1.0" encoding="utf-8"?>
 <p:sldLayout xmlns:a="http://schemas.openxmlformats.org/drawingml/2006/main" xmlns:r="http://schemas.openxmlformats.org/officeDocument/2006/relationships" xmlns:p="http://schemas.openxmlformats.org/presentationml/2006/main" type="title" preserve="1">
   <p:cSld name="Title Slide">
@@ -375,7 +816,7 @@
           <a:p>
             <a:fld id="{B0AAE9EB-4E09-49F4-B23B-25A5BA76B78B}" type="datetimeFigureOut">
               <a:rPr lang="en-IN" smtClean="0"/>
-              <a:t>02-05-2024</a:t>
+              <a:t>03-05-2024</a:t>
             </a:fld>
             <a:endParaRPr lang="en-IN"/>
           </a:p>
@@ -575,7 +1016,7 @@
           <a:p>
             <a:fld id="{B0AAE9EB-4E09-49F4-B23B-25A5BA76B78B}" type="datetimeFigureOut">
               <a:rPr lang="en-IN" smtClean="0"/>
-              <a:t>02-05-2024</a:t>
+              <a:t>03-05-2024</a:t>
             </a:fld>
             <a:endParaRPr lang="en-IN"/>
           </a:p>
@@ -785,7 +1226,7 @@
           <a:p>
             <a:fld id="{B0AAE9EB-4E09-49F4-B23B-25A5BA76B78B}" type="datetimeFigureOut">
               <a:rPr lang="en-IN" smtClean="0"/>
-              <a:t>02-05-2024</a:t>
+              <a:t>03-05-2024</a:t>
             </a:fld>
             <a:endParaRPr lang="en-IN"/>
           </a:p>
@@ -985,7 +1426,7 @@
           <a:p>
             <a:fld id="{B0AAE9EB-4E09-49F4-B23B-25A5BA76B78B}" type="datetimeFigureOut">
               <a:rPr lang="en-IN" smtClean="0"/>
-              <a:t>02-05-2024</a:t>
+              <a:t>03-05-2024</a:t>
             </a:fld>
             <a:endParaRPr lang="en-IN"/>
           </a:p>
@@ -1261,7 +1702,7 @@
           <a:p>
             <a:fld id="{B0AAE9EB-4E09-49F4-B23B-25A5BA76B78B}" type="datetimeFigureOut">
               <a:rPr lang="en-IN" smtClean="0"/>
-              <a:t>02-05-2024</a:t>
+              <a:t>03-05-2024</a:t>
             </a:fld>
             <a:endParaRPr lang="en-IN"/>
           </a:p>
@@ -1529,7 +1970,7 @@
           <a:p>
             <a:fld id="{B0AAE9EB-4E09-49F4-B23B-25A5BA76B78B}" type="datetimeFigureOut">
               <a:rPr lang="en-IN" smtClean="0"/>
-              <a:t>02-05-2024</a:t>
+              <a:t>03-05-2024</a:t>
             </a:fld>
             <a:endParaRPr lang="en-IN"/>
           </a:p>
@@ -1944,7 +2385,7 @@
           <a:p>
             <a:fld id="{B0AAE9EB-4E09-49F4-B23B-25A5BA76B78B}" type="datetimeFigureOut">
               <a:rPr lang="en-IN" smtClean="0"/>
-              <a:t>02-05-2024</a:t>
+              <a:t>03-05-2024</a:t>
             </a:fld>
             <a:endParaRPr lang="en-IN"/>
           </a:p>
@@ -2086,7 +2527,7 @@
           <a:p>
             <a:fld id="{B0AAE9EB-4E09-49F4-B23B-25A5BA76B78B}" type="datetimeFigureOut">
               <a:rPr lang="en-IN" smtClean="0"/>
-              <a:t>02-05-2024</a:t>
+              <a:t>03-05-2024</a:t>
             </a:fld>
             <a:endParaRPr lang="en-IN"/>
           </a:p>
@@ -2199,7 +2640,7 @@
           <a:p>
             <a:fld id="{B0AAE9EB-4E09-49F4-B23B-25A5BA76B78B}" type="datetimeFigureOut">
               <a:rPr lang="en-IN" smtClean="0"/>
-              <a:t>02-05-2024</a:t>
+              <a:t>03-05-2024</a:t>
             </a:fld>
             <a:endParaRPr lang="en-IN"/>
           </a:p>
@@ -2512,7 +2953,7 @@
           <a:p>
             <a:fld id="{B0AAE9EB-4E09-49F4-B23B-25A5BA76B78B}" type="datetimeFigureOut">
               <a:rPr lang="en-IN" smtClean="0"/>
-              <a:t>02-05-2024</a:t>
+              <a:t>03-05-2024</a:t>
             </a:fld>
             <a:endParaRPr lang="en-IN"/>
           </a:p>
@@ -2801,7 +3242,7 @@
           <a:p>
             <a:fld id="{B0AAE9EB-4E09-49F4-B23B-25A5BA76B78B}" type="datetimeFigureOut">
               <a:rPr lang="en-IN" smtClean="0"/>
-              <a:t>02-05-2024</a:t>
+              <a:t>03-05-2024</a:t>
             </a:fld>
             <a:endParaRPr lang="en-IN"/>
           </a:p>
@@ -3044,7 +3485,7 @@
           <a:p>
             <a:fld id="{B0AAE9EB-4E09-49F4-B23B-25A5BA76B78B}" type="datetimeFigureOut">
               <a:rPr lang="en-IN" smtClean="0"/>
-              <a:t>02-05-2024</a:t>
+              <a:t>03-05-2024</a:t>
             </a:fld>
             <a:endParaRPr lang="en-IN"/>
           </a:p>
@@ -5830,6 +6271,16 @@
 <file path=ppt/slides/slide19.xml><?xml version="1.0" encoding="utf-8"?>
 <p:sld xmlns:a="http://schemas.openxmlformats.org/drawingml/2006/main" xmlns:r="http://schemas.openxmlformats.org/officeDocument/2006/relationships" xmlns:p="http://schemas.openxmlformats.org/presentationml/2006/main">
   <p:cSld>
+    <p:bg>
+      <p:bgPr>
+        <a:solidFill>
+          <a:schemeClr val="accent5">
+            <a:lumMod val="50000"/>
+          </a:schemeClr>
+        </a:solidFill>
+        <a:effectLst/>
+      </p:bgPr>
+    </p:bg>
     <p:spTree>
       <p:nvGrpSpPr>
         <p:cNvPr id="1" name=""/>
@@ -6692,7 +7143,7 @@
       </p:grpSpPr>
       <p:sp>
         <p:nvSpPr>
-          <p:cNvPr id="6" name="Rectangle: Rounded Corners 5">
+          <p:cNvPr id="6" name="Rectangle 5">
             <a:extLst>
               <a:ext uri="{FF2B5EF4-FFF2-40B4-BE49-F238E27FC236}">
                 <a16:creationId xmlns:a16="http://schemas.microsoft.com/office/drawing/2014/main" id="{6056F683-21B7-413F-BE02-41A6C74592E5}"/>
@@ -6704,19 +7155,14 @@
         </p:nvSpPr>
         <p:spPr>
           <a:xfrm>
-            <a:off x="741331" y="698863"/>
+            <a:off x="741330" y="698863"/>
             <a:ext cx="10709340" cy="5460274"/>
           </a:xfrm>
-          <a:prstGeom prst="roundRect">
-            <a:avLst>
-              <a:gd name="adj" fmla="val 12529"/>
-            </a:avLst>
+          <a:prstGeom prst="rect">
+            <a:avLst/>
           </a:prstGeom>
           <a:solidFill>
-            <a:schemeClr val="tx1">
-              <a:lumMod val="95000"/>
-              <a:lumOff val="5000"/>
-            </a:schemeClr>
+            <a:schemeClr val="tx1"/>
           </a:solidFill>
           <a:ln>
             <a:solidFill>
@@ -6776,12 +7222,17 @@
         </p:blipFill>
         <p:spPr>
           <a:xfrm>
-            <a:off x="3185582" y="1606094"/>
-            <a:ext cx="5820836" cy="3645812"/>
+            <a:off x="3185580" y="1595412"/>
+            <a:ext cx="5820836" cy="3645813"/>
           </a:xfrm>
           <a:prstGeom prst="rect">
             <a:avLst/>
           </a:prstGeom>
+          <a:ln>
+            <a:solidFill>
+              <a:schemeClr val="tx1"/>
+            </a:solidFill>
+          </a:ln>
         </p:spPr>
       </p:pic>
       <p:sp>
@@ -6798,14 +7249,18 @@
         </p:nvSpPr>
         <p:spPr>
           <a:xfrm>
-            <a:off x="5617029" y="2103120"/>
-            <a:ext cx="1772891" cy="1528354"/>
+            <a:off x="7635177" y="2539148"/>
+            <a:ext cx="182204" cy="157072"/>
           </a:xfrm>
           <a:prstGeom prst="triangle">
             <a:avLst/>
           </a:prstGeom>
           <a:noFill/>
-          <a:ln w="76200"/>
+          <a:ln w="38100">
+            <a:solidFill>
+              <a:schemeClr val="tx1"/>
+            </a:solidFill>
+          </a:ln>
         </p:spPr>
         <p:style>
           <a:lnRef idx="2">
@@ -6832,10 +7287,1187 @@
           </a:p>
         </p:txBody>
       </p:sp>
+      <p:sp>
+        <p:nvSpPr>
+          <p:cNvPr id="4" name="Oval 3">
+            <a:extLst>
+              <a:ext uri="{FF2B5EF4-FFF2-40B4-BE49-F238E27FC236}">
+                <a16:creationId xmlns:a16="http://schemas.microsoft.com/office/drawing/2014/main" id="{67D3016A-2BDB-7E53-FBEA-A5D281AE4A0D}"/>
+              </a:ext>
+            </a:extLst>
+          </p:cNvPr>
+          <p:cNvSpPr/>
+          <p:nvPr/>
+        </p:nvSpPr>
+        <p:spPr>
+          <a:xfrm>
+            <a:off x="8038907" y="2940272"/>
+            <a:ext cx="207362" cy="207362"/>
+          </a:xfrm>
+          <a:prstGeom prst="ellipse">
+            <a:avLst/>
+          </a:prstGeom>
+          <a:noFill/>
+          <a:ln w="38100">
+            <a:solidFill>
+              <a:schemeClr val="tx1"/>
+            </a:solidFill>
+          </a:ln>
+        </p:spPr>
+        <p:style>
+          <a:lnRef idx="2">
+            <a:schemeClr val="accent1">
+              <a:shade val="15000"/>
+            </a:schemeClr>
+          </a:lnRef>
+          <a:fillRef idx="1">
+            <a:schemeClr val="accent1"/>
+          </a:fillRef>
+          <a:effectRef idx="0">
+            <a:schemeClr val="accent1"/>
+          </a:effectRef>
+          <a:fontRef idx="minor">
+            <a:schemeClr val="lt1"/>
+          </a:fontRef>
+        </p:style>
+        <p:txBody>
+          <a:bodyPr rtlCol="0" anchor="ctr"/>
+          <a:lstStyle/>
+          <a:p>
+            <a:pPr algn="ctr"/>
+            <a:endParaRPr lang="en-IN"/>
+          </a:p>
+        </p:txBody>
+      </p:sp>
+      <p:sp>
+        <p:nvSpPr>
+          <p:cNvPr id="12" name="Rectangle 11">
+            <a:extLst>
+              <a:ext uri="{FF2B5EF4-FFF2-40B4-BE49-F238E27FC236}">
+                <a16:creationId xmlns:a16="http://schemas.microsoft.com/office/drawing/2014/main" id="{BEF1B4AA-B8C3-D588-AB1E-4C2564CD2243}"/>
+              </a:ext>
+            </a:extLst>
+          </p:cNvPr>
+          <p:cNvSpPr/>
+          <p:nvPr/>
+        </p:nvSpPr>
+        <p:spPr>
+          <a:xfrm>
+            <a:off x="7207366" y="2948481"/>
+            <a:ext cx="169580" cy="169580"/>
+          </a:xfrm>
+          <a:prstGeom prst="rect">
+            <a:avLst/>
+          </a:prstGeom>
+          <a:noFill/>
+          <a:ln w="38100">
+            <a:solidFill>
+              <a:schemeClr val="tx1"/>
+            </a:solidFill>
+          </a:ln>
+        </p:spPr>
+        <p:style>
+          <a:lnRef idx="2">
+            <a:schemeClr val="accent1">
+              <a:shade val="15000"/>
+            </a:schemeClr>
+          </a:lnRef>
+          <a:fillRef idx="1">
+            <a:schemeClr val="accent1"/>
+          </a:fillRef>
+          <a:effectRef idx="0">
+            <a:schemeClr val="accent1"/>
+          </a:effectRef>
+          <a:fontRef idx="minor">
+            <a:schemeClr val="lt1"/>
+          </a:fontRef>
+        </p:style>
+        <p:txBody>
+          <a:bodyPr rtlCol="0" anchor="ctr"/>
+          <a:lstStyle/>
+          <a:p>
+            <a:pPr algn="ctr"/>
+            <a:endParaRPr lang="en-IN"/>
+          </a:p>
+        </p:txBody>
+      </p:sp>
+      <p:pic>
+        <p:nvPicPr>
+          <p:cNvPr id="15" name="Graphic 14" descr="Close with solid fill">
+            <a:extLst>
+              <a:ext uri="{FF2B5EF4-FFF2-40B4-BE49-F238E27FC236}">
+                <a16:creationId xmlns:a16="http://schemas.microsoft.com/office/drawing/2014/main" id="{320FEE1C-B596-6673-EFDE-404FCF65BC72}"/>
+              </a:ext>
+            </a:extLst>
+          </p:cNvPr>
+          <p:cNvPicPr>
+            <a:picLocks noChangeAspect="1"/>
+          </p:cNvPicPr>
+          <p:nvPr/>
+        </p:nvPicPr>
+        <p:blipFill>
+          <a:blip r:embed="rId3">
+            <a:extLst>
+              <a:ext uri="{28A0092B-C50C-407E-A947-70E740481C1C}">
+                <a14:useLocalDpi xmlns:a14="http://schemas.microsoft.com/office/drawing/2010/main" val="0"/>
+              </a:ext>
+              <a:ext uri="{96DAC541-7B7A-43D3-8B79-37D633B846F1}">
+                <asvg:svgBlip xmlns:asvg="http://schemas.microsoft.com/office/drawing/2016/SVG/main" r:embed="rId4"/>
+              </a:ext>
+            </a:extLst>
+          </a:blip>
+          <a:stretch>
+            <a:fillRect/>
+          </a:stretch>
+        </p:blipFill>
+        <p:spPr>
+          <a:xfrm>
+            <a:off x="7589666" y="3342022"/>
+            <a:ext cx="273218" cy="273218"/>
+          </a:xfrm>
+          <a:prstGeom prst="rect">
+            <a:avLst/>
+          </a:prstGeom>
+        </p:spPr>
+      </p:pic>
     </p:spTree>
     <p:extLst>
       <p:ext uri="{BB962C8B-B14F-4D97-AF65-F5344CB8AC3E}">
         <p14:creationId xmlns:p14="http://schemas.microsoft.com/office/powerpoint/2010/main" val="3200742922"/>
+      </p:ext>
+    </p:extLst>
+  </p:cSld>
+  <p:clrMapOvr>
+    <a:masterClrMapping/>
+  </p:clrMapOvr>
+</p:sld>
+</file>
+
+<file path=ppt/slides/slide21.xml><?xml version="1.0" encoding="utf-8"?>
+<p:sld xmlns:a="http://schemas.openxmlformats.org/drawingml/2006/main" xmlns:r="http://schemas.openxmlformats.org/officeDocument/2006/relationships" xmlns:p="http://schemas.openxmlformats.org/presentationml/2006/main">
+  <p:cSld>
+    <p:spTree>
+      <p:nvGrpSpPr>
+        <p:cNvPr id="1" name=""/>
+        <p:cNvGrpSpPr/>
+        <p:nvPr/>
+      </p:nvGrpSpPr>
+      <p:grpSpPr>
+        <a:xfrm>
+          <a:off x="0" y="0"/>
+          <a:ext cx="0" cy="0"/>
+          <a:chOff x="0" y="0"/>
+          <a:chExt cx="0" cy="0"/>
+        </a:xfrm>
+      </p:grpSpPr>
+      <p:pic>
+        <p:nvPicPr>
+          <p:cNvPr id="2" name="Picture 1">
+            <a:extLst>
+              <a:ext uri="{FF2B5EF4-FFF2-40B4-BE49-F238E27FC236}">
+                <a16:creationId xmlns:a16="http://schemas.microsoft.com/office/drawing/2014/main" id="{32023A7E-582B-F8C0-36B6-0C0A2D8EF9BD}"/>
+              </a:ext>
+            </a:extLst>
+          </p:cNvPr>
+          <p:cNvPicPr>
+            <a:picLocks noChangeAspect="1"/>
+          </p:cNvPicPr>
+          <p:nvPr/>
+        </p:nvPicPr>
+        <p:blipFill>
+          <a:blip r:embed="rId2"/>
+          <a:stretch>
+            <a:fillRect/>
+          </a:stretch>
+        </p:blipFill>
+        <p:spPr>
+          <a:xfrm>
+            <a:off x="734103" y="691659"/>
+            <a:ext cx="10723793" cy="5474682"/>
+          </a:xfrm>
+          <a:prstGeom prst="rect">
+            <a:avLst/>
+          </a:prstGeom>
+        </p:spPr>
+      </p:pic>
+    </p:spTree>
+    <p:extLst>
+      <p:ext uri="{BB962C8B-B14F-4D97-AF65-F5344CB8AC3E}">
+        <p14:creationId xmlns:p14="http://schemas.microsoft.com/office/powerpoint/2010/main" val="808542811"/>
+      </p:ext>
+    </p:extLst>
+  </p:cSld>
+  <p:clrMapOvr>
+    <a:masterClrMapping/>
+  </p:clrMapOvr>
+</p:sld>
+</file>
+
+<file path=ppt/slides/slide22.xml><?xml version="1.0" encoding="utf-8"?>
+<p:sld xmlns:a="http://schemas.openxmlformats.org/drawingml/2006/main" xmlns:r="http://schemas.openxmlformats.org/officeDocument/2006/relationships" xmlns:p="http://schemas.openxmlformats.org/presentationml/2006/main">
+  <p:cSld>
+    <p:spTree>
+      <p:nvGrpSpPr>
+        <p:cNvPr id="1" name=""/>
+        <p:cNvGrpSpPr/>
+        <p:nvPr/>
+      </p:nvGrpSpPr>
+      <p:grpSpPr>
+        <a:xfrm>
+          <a:off x="0" y="0"/>
+          <a:ext cx="0" cy="0"/>
+          <a:chOff x="0" y="0"/>
+          <a:chExt cx="0" cy="0"/>
+        </a:xfrm>
+      </p:grpSpPr>
+      <p:pic>
+        <p:nvPicPr>
+          <p:cNvPr id="3" name="Picture 2">
+            <a:extLst>
+              <a:ext uri="{FF2B5EF4-FFF2-40B4-BE49-F238E27FC236}">
+                <a16:creationId xmlns:a16="http://schemas.microsoft.com/office/drawing/2014/main" id="{D23E5464-78BE-CE96-996D-2BF7F5A44BD3}"/>
+              </a:ext>
+            </a:extLst>
+          </p:cNvPr>
+          <p:cNvPicPr>
+            <a:picLocks noChangeAspect="1"/>
+          </p:cNvPicPr>
+          <p:nvPr/>
+        </p:nvPicPr>
+        <p:blipFill>
+          <a:blip r:embed="rId2"/>
+          <a:stretch>
+            <a:fillRect/>
+          </a:stretch>
+        </p:blipFill>
+        <p:spPr>
+          <a:xfrm>
+            <a:off x="734103" y="691659"/>
+            <a:ext cx="10723793" cy="5474682"/>
+          </a:xfrm>
+          <a:prstGeom prst="rect">
+            <a:avLst/>
+          </a:prstGeom>
+          <a:ln>
+            <a:noFill/>
+          </a:ln>
+        </p:spPr>
+      </p:pic>
+    </p:spTree>
+    <p:extLst>
+      <p:ext uri="{BB962C8B-B14F-4D97-AF65-F5344CB8AC3E}">
+        <p14:creationId xmlns:p14="http://schemas.microsoft.com/office/powerpoint/2010/main" val="2769597317"/>
+      </p:ext>
+    </p:extLst>
+  </p:cSld>
+  <p:clrMapOvr>
+    <a:masterClrMapping/>
+  </p:clrMapOvr>
+</p:sld>
+</file>
+
+<file path=ppt/slides/slide23.xml><?xml version="1.0" encoding="utf-8"?>
+<p:sld xmlns:a="http://schemas.openxmlformats.org/drawingml/2006/main" xmlns:r="http://schemas.openxmlformats.org/officeDocument/2006/relationships" xmlns:p="http://schemas.openxmlformats.org/presentationml/2006/main">
+  <p:cSld>
+    <p:bg>
+      <p:bgPr>
+        <a:solidFill>
+          <a:schemeClr val="tx1">
+            <a:lumMod val="75000"/>
+            <a:lumOff val="25000"/>
+          </a:schemeClr>
+        </a:solidFill>
+        <a:effectLst/>
+      </p:bgPr>
+    </p:bg>
+    <p:spTree>
+      <p:nvGrpSpPr>
+        <p:cNvPr id="1" name=""/>
+        <p:cNvGrpSpPr/>
+        <p:nvPr/>
+      </p:nvGrpSpPr>
+      <p:grpSpPr>
+        <a:xfrm>
+          <a:off x="0" y="0"/>
+          <a:ext cx="0" cy="0"/>
+          <a:chOff x="0" y="0"/>
+          <a:chExt cx="0" cy="0"/>
+        </a:xfrm>
+      </p:grpSpPr>
+      <p:pic>
+        <p:nvPicPr>
+          <p:cNvPr id="5" name="Picture 4">
+            <a:extLst>
+              <a:ext uri="{FF2B5EF4-FFF2-40B4-BE49-F238E27FC236}">
+                <a16:creationId xmlns:a16="http://schemas.microsoft.com/office/drawing/2014/main" id="{39BB3F98-BE25-577B-9CAB-4769E11FA179}"/>
+              </a:ext>
+            </a:extLst>
+          </p:cNvPr>
+          <p:cNvPicPr>
+            <a:picLocks noChangeAspect="1"/>
+          </p:cNvPicPr>
+          <p:nvPr/>
+        </p:nvPicPr>
+        <p:blipFill>
+          <a:blip r:embed="rId3">
+            <a:extLst>
+              <a:ext uri="{28A0092B-C50C-407E-A947-70E740481C1C}">
+                <a14:useLocalDpi xmlns:a14="http://schemas.microsoft.com/office/drawing/2010/main" val="0"/>
+              </a:ext>
+            </a:extLst>
+          </a:blip>
+          <a:stretch>
+            <a:fillRect/>
+          </a:stretch>
+        </p:blipFill>
+        <p:spPr>
+          <a:xfrm>
+            <a:off x="2934414" y="1591143"/>
+            <a:ext cx="6429240" cy="4396154"/>
+          </a:xfrm>
+          <a:prstGeom prst="rect">
+            <a:avLst/>
+          </a:prstGeom>
+        </p:spPr>
+      </p:pic>
+      <p:grpSp>
+        <p:nvGrpSpPr>
+          <p:cNvPr id="6" name="Group 5">
+            <a:extLst>
+              <a:ext uri="{FF2B5EF4-FFF2-40B4-BE49-F238E27FC236}">
+                <a16:creationId xmlns:a16="http://schemas.microsoft.com/office/drawing/2014/main" id="{E7862747-8AA7-C614-0358-BE0F5196EE05}"/>
+              </a:ext>
+            </a:extLst>
+          </p:cNvPr>
+          <p:cNvGrpSpPr/>
+          <p:nvPr/>
+        </p:nvGrpSpPr>
+        <p:grpSpPr>
+          <a:xfrm>
+            <a:off x="2440781" y="1427948"/>
+            <a:ext cx="2102795" cy="570612"/>
+            <a:chOff x="1922737" y="1041642"/>
+            <a:chExt cx="2505572" cy="679907"/>
+          </a:xfrm>
+        </p:grpSpPr>
+        <p:cxnSp>
+          <p:nvCxnSpPr>
+            <p:cNvPr id="7" name="Straight Connector 6">
+              <a:extLst>
+                <a:ext uri="{FF2B5EF4-FFF2-40B4-BE49-F238E27FC236}">
+                  <a16:creationId xmlns:a16="http://schemas.microsoft.com/office/drawing/2014/main" id="{8F40AB6D-55D5-6C44-020E-FAE98A9A866C}"/>
+                </a:ext>
+              </a:extLst>
+            </p:cNvPr>
+            <p:cNvCxnSpPr/>
+            <p:nvPr/>
+          </p:nvCxnSpPr>
+          <p:spPr>
+            <a:xfrm flipH="1" flipV="1">
+              <a:off x="3553097" y="1042280"/>
+              <a:ext cx="875212" cy="679269"/>
+            </a:xfrm>
+            <a:prstGeom prst="line">
+              <a:avLst/>
+            </a:prstGeom>
+            <a:ln w="38100" cap="rnd">
+              <a:solidFill>
+                <a:schemeClr val="bg1"/>
+              </a:solidFill>
+              <a:round/>
+            </a:ln>
+          </p:spPr>
+          <p:style>
+            <a:lnRef idx="2">
+              <a:schemeClr val="accent1"/>
+            </a:lnRef>
+            <a:fillRef idx="0">
+              <a:schemeClr val="accent1"/>
+            </a:fillRef>
+            <a:effectRef idx="1">
+              <a:schemeClr val="accent1"/>
+            </a:effectRef>
+            <a:fontRef idx="minor">
+              <a:schemeClr val="tx1"/>
+            </a:fontRef>
+          </p:style>
+        </p:cxnSp>
+        <p:cxnSp>
+          <p:nvCxnSpPr>
+            <p:cNvPr id="8" name="Straight Connector 7">
+              <a:extLst>
+                <a:ext uri="{FF2B5EF4-FFF2-40B4-BE49-F238E27FC236}">
+                  <a16:creationId xmlns:a16="http://schemas.microsoft.com/office/drawing/2014/main" id="{235930A1-32BC-80D3-9E0F-8C52F7057D2A}"/>
+                </a:ext>
+              </a:extLst>
+            </p:cNvPr>
+            <p:cNvCxnSpPr>
+              <a:cxnSpLocks/>
+            </p:cNvCxnSpPr>
+            <p:nvPr/>
+          </p:nvCxnSpPr>
+          <p:spPr>
+            <a:xfrm flipH="1">
+              <a:off x="1922737" y="1041642"/>
+              <a:ext cx="1627915" cy="0"/>
+            </a:xfrm>
+            <a:prstGeom prst="line">
+              <a:avLst/>
+            </a:prstGeom>
+            <a:ln w="38100" cap="rnd">
+              <a:solidFill>
+                <a:schemeClr val="bg1"/>
+              </a:solidFill>
+              <a:round/>
+            </a:ln>
+          </p:spPr>
+          <p:style>
+            <a:lnRef idx="2">
+              <a:schemeClr val="accent1"/>
+            </a:lnRef>
+            <a:fillRef idx="0">
+              <a:schemeClr val="accent1"/>
+            </a:fillRef>
+            <a:effectRef idx="1">
+              <a:schemeClr val="accent1"/>
+            </a:effectRef>
+            <a:fontRef idx="minor">
+              <a:schemeClr val="tx1"/>
+            </a:fontRef>
+          </p:style>
+        </p:cxnSp>
+      </p:grpSp>
+      <p:sp>
+        <p:nvSpPr>
+          <p:cNvPr id="9" name="TextBox 8">
+            <a:extLst>
+              <a:ext uri="{FF2B5EF4-FFF2-40B4-BE49-F238E27FC236}">
+                <a16:creationId xmlns:a16="http://schemas.microsoft.com/office/drawing/2014/main" id="{DA65865A-44C5-F88D-04FB-CC02AE5569CD}"/>
+              </a:ext>
+            </a:extLst>
+          </p:cNvPr>
+          <p:cNvSpPr txBox="1"/>
+          <p:nvPr/>
+        </p:nvSpPr>
+        <p:spPr>
+          <a:xfrm>
+            <a:off x="2163272" y="1069661"/>
+            <a:ext cx="1955409" cy="369332"/>
+          </a:xfrm>
+          <a:prstGeom prst="rect">
+            <a:avLst/>
+          </a:prstGeom>
+          <a:noFill/>
+        </p:spPr>
+        <p:txBody>
+          <a:bodyPr wrap="square" rtlCol="0">
+            <a:spAutoFit/>
+          </a:bodyPr>
+          <a:lstStyle/>
+          <a:p>
+            <a:pPr algn="ctr"/>
+            <a:r>
+              <a:rPr lang="en-US" dirty="0">
+                <a:solidFill>
+                  <a:schemeClr val="bg1"/>
+                </a:solidFill>
+                <a:latin typeface="Century Gothic" panose="020B0502020202020204" pitchFamily="34" charset="0"/>
+              </a:rPr>
+              <a:t>Play/Pause</a:t>
+            </a:r>
+            <a:endParaRPr lang="en-IN" dirty="0">
+              <a:solidFill>
+                <a:schemeClr val="bg1"/>
+              </a:solidFill>
+              <a:latin typeface="Century Gothic" panose="020B0502020202020204" pitchFamily="34" charset="0"/>
+            </a:endParaRPr>
+          </a:p>
+        </p:txBody>
+      </p:sp>
+      <p:grpSp>
+        <p:nvGrpSpPr>
+          <p:cNvPr id="14" name="Group 13">
+            <a:extLst>
+              <a:ext uri="{FF2B5EF4-FFF2-40B4-BE49-F238E27FC236}">
+                <a16:creationId xmlns:a16="http://schemas.microsoft.com/office/drawing/2014/main" id="{18D21739-CC09-7959-C08F-0369F4F0E23F}"/>
+              </a:ext>
+            </a:extLst>
+          </p:cNvPr>
+          <p:cNvGrpSpPr/>
+          <p:nvPr/>
+        </p:nvGrpSpPr>
+        <p:grpSpPr>
+          <a:xfrm flipV="1">
+            <a:off x="1703240" y="3544282"/>
+            <a:ext cx="5468648" cy="1048289"/>
+            <a:chOff x="-1354462" y="1041642"/>
+            <a:chExt cx="6516133" cy="1249079"/>
+          </a:xfrm>
+        </p:grpSpPr>
+        <p:cxnSp>
+          <p:nvCxnSpPr>
+            <p:cNvPr id="15" name="Straight Connector 14">
+              <a:extLst>
+                <a:ext uri="{FF2B5EF4-FFF2-40B4-BE49-F238E27FC236}">
+                  <a16:creationId xmlns:a16="http://schemas.microsoft.com/office/drawing/2014/main" id="{2D565F08-1426-BB26-5E61-0FABA3027B29}"/>
+                </a:ext>
+              </a:extLst>
+            </p:cNvPr>
+            <p:cNvCxnSpPr>
+              <a:cxnSpLocks/>
+            </p:cNvCxnSpPr>
+            <p:nvPr/>
+          </p:nvCxnSpPr>
+          <p:spPr>
+            <a:xfrm flipH="1" flipV="1">
+              <a:off x="3553098" y="1042279"/>
+              <a:ext cx="1608573" cy="1248442"/>
+            </a:xfrm>
+            <a:prstGeom prst="line">
+              <a:avLst/>
+            </a:prstGeom>
+            <a:ln w="38100" cap="rnd">
+              <a:solidFill>
+                <a:schemeClr val="bg1"/>
+              </a:solidFill>
+              <a:round/>
+            </a:ln>
+          </p:spPr>
+          <p:style>
+            <a:lnRef idx="2">
+              <a:schemeClr val="accent1"/>
+            </a:lnRef>
+            <a:fillRef idx="0">
+              <a:schemeClr val="accent1"/>
+            </a:fillRef>
+            <a:effectRef idx="1">
+              <a:schemeClr val="accent1"/>
+            </a:effectRef>
+            <a:fontRef idx="minor">
+              <a:schemeClr val="tx1"/>
+            </a:fontRef>
+          </p:style>
+        </p:cxnSp>
+        <p:cxnSp>
+          <p:nvCxnSpPr>
+            <p:cNvPr id="16" name="Straight Connector 15">
+              <a:extLst>
+                <a:ext uri="{FF2B5EF4-FFF2-40B4-BE49-F238E27FC236}">
+                  <a16:creationId xmlns:a16="http://schemas.microsoft.com/office/drawing/2014/main" id="{ED7F7A61-D527-1C81-1297-87693914F9CB}"/>
+                </a:ext>
+              </a:extLst>
+            </p:cNvPr>
+            <p:cNvCxnSpPr>
+              <a:cxnSpLocks/>
+            </p:cNvCxnSpPr>
+            <p:nvPr/>
+          </p:nvCxnSpPr>
+          <p:spPr>
+            <a:xfrm flipH="1" flipV="1">
+              <a:off x="-1354462" y="1041642"/>
+              <a:ext cx="4905114" cy="0"/>
+            </a:xfrm>
+            <a:prstGeom prst="line">
+              <a:avLst/>
+            </a:prstGeom>
+            <a:ln w="38100" cap="rnd">
+              <a:solidFill>
+                <a:schemeClr val="bg1"/>
+              </a:solidFill>
+              <a:round/>
+            </a:ln>
+          </p:spPr>
+          <p:style>
+            <a:lnRef idx="2">
+              <a:schemeClr val="accent1"/>
+            </a:lnRef>
+            <a:fillRef idx="0">
+              <a:schemeClr val="accent1"/>
+            </a:fillRef>
+            <a:effectRef idx="1">
+              <a:schemeClr val="accent1"/>
+            </a:effectRef>
+            <a:fontRef idx="minor">
+              <a:schemeClr val="tx1"/>
+            </a:fontRef>
+          </p:style>
+        </p:cxnSp>
+      </p:grpSp>
+      <p:sp>
+        <p:nvSpPr>
+          <p:cNvPr id="25" name="TextBox 24">
+            <a:extLst>
+              <a:ext uri="{FF2B5EF4-FFF2-40B4-BE49-F238E27FC236}">
+                <a16:creationId xmlns:a16="http://schemas.microsoft.com/office/drawing/2014/main" id="{3B613CDB-7F82-54F3-EF53-12C9BFDF9273}"/>
+              </a:ext>
+            </a:extLst>
+          </p:cNvPr>
+          <p:cNvSpPr txBox="1"/>
+          <p:nvPr/>
+        </p:nvSpPr>
+        <p:spPr>
+          <a:xfrm>
+            <a:off x="1476932" y="4225039"/>
+            <a:ext cx="1955409" cy="369332"/>
+          </a:xfrm>
+          <a:prstGeom prst="rect">
+            <a:avLst/>
+          </a:prstGeom>
+          <a:noFill/>
+        </p:spPr>
+        <p:txBody>
+          <a:bodyPr wrap="square" rtlCol="0">
+            <a:spAutoFit/>
+          </a:bodyPr>
+          <a:lstStyle/>
+          <a:p>
+            <a:pPr algn="ctr"/>
+            <a:r>
+              <a:rPr lang="en-US" dirty="0">
+                <a:solidFill>
+                  <a:schemeClr val="bg1"/>
+                </a:solidFill>
+                <a:latin typeface="Century Gothic" panose="020B0502020202020204" pitchFamily="34" charset="0"/>
+              </a:rPr>
+              <a:t>Movement</a:t>
+            </a:r>
+            <a:endParaRPr lang="en-IN" dirty="0">
+              <a:solidFill>
+                <a:schemeClr val="bg1"/>
+              </a:solidFill>
+              <a:latin typeface="Century Gothic" panose="020B0502020202020204" pitchFamily="34" charset="0"/>
+            </a:endParaRPr>
+          </a:p>
+        </p:txBody>
+      </p:sp>
+      <p:grpSp>
+        <p:nvGrpSpPr>
+          <p:cNvPr id="27" name="Group 26">
+            <a:extLst>
+              <a:ext uri="{FF2B5EF4-FFF2-40B4-BE49-F238E27FC236}">
+                <a16:creationId xmlns:a16="http://schemas.microsoft.com/office/drawing/2014/main" id="{D9F3A35E-7687-51E0-B8DE-62D7A503EA4B}"/>
+              </a:ext>
+            </a:extLst>
+          </p:cNvPr>
+          <p:cNvGrpSpPr/>
+          <p:nvPr/>
+        </p:nvGrpSpPr>
+        <p:grpSpPr>
+          <a:xfrm flipH="1" flipV="1">
+            <a:off x="7984508" y="3252644"/>
+            <a:ext cx="2503379" cy="570612"/>
+            <a:chOff x="1445424" y="1041642"/>
+            <a:chExt cx="2982885" cy="679907"/>
+          </a:xfrm>
+        </p:grpSpPr>
+        <p:cxnSp>
+          <p:nvCxnSpPr>
+            <p:cNvPr id="28" name="Straight Connector 27">
+              <a:extLst>
+                <a:ext uri="{FF2B5EF4-FFF2-40B4-BE49-F238E27FC236}">
+                  <a16:creationId xmlns:a16="http://schemas.microsoft.com/office/drawing/2014/main" id="{3CC9CF02-5514-3436-20A1-8A305ECE0360}"/>
+                </a:ext>
+              </a:extLst>
+            </p:cNvPr>
+            <p:cNvCxnSpPr/>
+            <p:nvPr/>
+          </p:nvCxnSpPr>
+          <p:spPr>
+            <a:xfrm flipH="1" flipV="1">
+              <a:off x="3553097" y="1042280"/>
+              <a:ext cx="875212" cy="679269"/>
+            </a:xfrm>
+            <a:prstGeom prst="line">
+              <a:avLst/>
+            </a:prstGeom>
+            <a:ln w="38100" cap="rnd">
+              <a:solidFill>
+                <a:schemeClr val="bg1"/>
+              </a:solidFill>
+              <a:round/>
+            </a:ln>
+          </p:spPr>
+          <p:style>
+            <a:lnRef idx="2">
+              <a:schemeClr val="accent1"/>
+            </a:lnRef>
+            <a:fillRef idx="0">
+              <a:schemeClr val="accent1"/>
+            </a:fillRef>
+            <a:effectRef idx="1">
+              <a:schemeClr val="accent1"/>
+            </a:effectRef>
+            <a:fontRef idx="minor">
+              <a:schemeClr val="tx1"/>
+            </a:fontRef>
+          </p:style>
+        </p:cxnSp>
+        <p:cxnSp>
+          <p:nvCxnSpPr>
+            <p:cNvPr id="29" name="Straight Connector 28">
+              <a:extLst>
+                <a:ext uri="{FF2B5EF4-FFF2-40B4-BE49-F238E27FC236}">
+                  <a16:creationId xmlns:a16="http://schemas.microsoft.com/office/drawing/2014/main" id="{509413CE-9B57-3786-78F4-0B40817AD5B4}"/>
+                </a:ext>
+              </a:extLst>
+            </p:cNvPr>
+            <p:cNvCxnSpPr>
+              <a:cxnSpLocks/>
+            </p:cNvCxnSpPr>
+            <p:nvPr/>
+          </p:nvCxnSpPr>
+          <p:spPr>
+            <a:xfrm flipH="1" flipV="1">
+              <a:off x="1445424" y="1041642"/>
+              <a:ext cx="2105229" cy="0"/>
+            </a:xfrm>
+            <a:prstGeom prst="line">
+              <a:avLst/>
+            </a:prstGeom>
+            <a:ln w="38100" cap="rnd">
+              <a:solidFill>
+                <a:schemeClr val="bg1"/>
+              </a:solidFill>
+              <a:round/>
+            </a:ln>
+          </p:spPr>
+          <p:style>
+            <a:lnRef idx="2">
+              <a:schemeClr val="accent1"/>
+            </a:lnRef>
+            <a:fillRef idx="0">
+              <a:schemeClr val="accent1"/>
+            </a:fillRef>
+            <a:effectRef idx="1">
+              <a:schemeClr val="accent1"/>
+            </a:effectRef>
+            <a:fontRef idx="minor">
+              <a:schemeClr val="tx1"/>
+            </a:fontRef>
+          </p:style>
+        </p:cxnSp>
+      </p:grpSp>
+      <p:cxnSp>
+        <p:nvCxnSpPr>
+          <p:cNvPr id="32" name="Straight Connector 31">
+            <a:extLst>
+              <a:ext uri="{FF2B5EF4-FFF2-40B4-BE49-F238E27FC236}">
+                <a16:creationId xmlns:a16="http://schemas.microsoft.com/office/drawing/2014/main" id="{76CE73B6-A0AD-0941-6766-05F2431F82B4}"/>
+              </a:ext>
+            </a:extLst>
+          </p:cNvPr>
+          <p:cNvCxnSpPr>
+            <a:cxnSpLocks/>
+          </p:cNvCxnSpPr>
+          <p:nvPr/>
+        </p:nvCxnSpPr>
+        <p:spPr>
+          <a:xfrm>
+            <a:off x="8369951" y="2825986"/>
+            <a:ext cx="2117936" cy="0"/>
+          </a:xfrm>
+          <a:prstGeom prst="line">
+            <a:avLst/>
+          </a:prstGeom>
+          <a:ln w="38100" cap="rnd">
+            <a:solidFill>
+              <a:schemeClr val="bg1"/>
+            </a:solidFill>
+            <a:round/>
+          </a:ln>
+        </p:spPr>
+        <p:style>
+          <a:lnRef idx="2">
+            <a:schemeClr val="accent1"/>
+          </a:lnRef>
+          <a:fillRef idx="0">
+            <a:schemeClr val="accent1"/>
+          </a:fillRef>
+          <a:effectRef idx="1">
+            <a:schemeClr val="accent1"/>
+          </a:effectRef>
+          <a:fontRef idx="minor">
+            <a:schemeClr val="tx1"/>
+          </a:fontRef>
+        </p:style>
+      </p:cxnSp>
+      <p:grpSp>
+        <p:nvGrpSpPr>
+          <p:cNvPr id="36" name="Group 35">
+            <a:extLst>
+              <a:ext uri="{FF2B5EF4-FFF2-40B4-BE49-F238E27FC236}">
+                <a16:creationId xmlns:a16="http://schemas.microsoft.com/office/drawing/2014/main" id="{1B430F12-AFE0-2E04-EE06-8B5DE1564AFE}"/>
+              </a:ext>
+            </a:extLst>
+          </p:cNvPr>
+          <p:cNvGrpSpPr/>
+          <p:nvPr/>
+        </p:nvGrpSpPr>
+        <p:grpSpPr>
+          <a:xfrm flipH="1">
+            <a:off x="7984508" y="1828716"/>
+            <a:ext cx="2503379" cy="570612"/>
+            <a:chOff x="1445424" y="1041642"/>
+            <a:chExt cx="2982885" cy="679907"/>
+          </a:xfrm>
+        </p:grpSpPr>
+        <p:cxnSp>
+          <p:nvCxnSpPr>
+            <p:cNvPr id="37" name="Straight Connector 36">
+              <a:extLst>
+                <a:ext uri="{FF2B5EF4-FFF2-40B4-BE49-F238E27FC236}">
+                  <a16:creationId xmlns:a16="http://schemas.microsoft.com/office/drawing/2014/main" id="{CE72709C-35CF-2E83-AD54-DC02ACA943B5}"/>
+                </a:ext>
+              </a:extLst>
+            </p:cNvPr>
+            <p:cNvCxnSpPr/>
+            <p:nvPr/>
+          </p:nvCxnSpPr>
+          <p:spPr>
+            <a:xfrm flipH="1" flipV="1">
+              <a:off x="3553097" y="1042280"/>
+              <a:ext cx="875212" cy="679269"/>
+            </a:xfrm>
+            <a:prstGeom prst="line">
+              <a:avLst/>
+            </a:prstGeom>
+            <a:ln w="38100" cap="rnd">
+              <a:solidFill>
+                <a:schemeClr val="bg1"/>
+              </a:solidFill>
+              <a:round/>
+            </a:ln>
+          </p:spPr>
+          <p:style>
+            <a:lnRef idx="2">
+              <a:schemeClr val="accent1"/>
+            </a:lnRef>
+            <a:fillRef idx="0">
+              <a:schemeClr val="accent1"/>
+            </a:fillRef>
+            <a:effectRef idx="1">
+              <a:schemeClr val="accent1"/>
+            </a:effectRef>
+            <a:fontRef idx="minor">
+              <a:schemeClr val="tx1"/>
+            </a:fontRef>
+          </p:style>
+        </p:cxnSp>
+        <p:cxnSp>
+          <p:nvCxnSpPr>
+            <p:cNvPr id="38" name="Straight Connector 37">
+              <a:extLst>
+                <a:ext uri="{FF2B5EF4-FFF2-40B4-BE49-F238E27FC236}">
+                  <a16:creationId xmlns:a16="http://schemas.microsoft.com/office/drawing/2014/main" id="{68C03E46-C0B8-AADD-6B21-4682BB45D607}"/>
+                </a:ext>
+              </a:extLst>
+            </p:cNvPr>
+            <p:cNvCxnSpPr>
+              <a:cxnSpLocks/>
+            </p:cNvCxnSpPr>
+            <p:nvPr/>
+          </p:nvCxnSpPr>
+          <p:spPr>
+            <a:xfrm flipH="1" flipV="1">
+              <a:off x="1445424" y="1041642"/>
+              <a:ext cx="2105229" cy="0"/>
+            </a:xfrm>
+            <a:prstGeom prst="line">
+              <a:avLst/>
+            </a:prstGeom>
+            <a:ln w="38100" cap="rnd">
+              <a:solidFill>
+                <a:schemeClr val="bg1"/>
+              </a:solidFill>
+              <a:round/>
+            </a:ln>
+          </p:spPr>
+          <p:style>
+            <a:lnRef idx="2">
+              <a:schemeClr val="accent1"/>
+            </a:lnRef>
+            <a:fillRef idx="0">
+              <a:schemeClr val="accent1"/>
+            </a:fillRef>
+            <a:effectRef idx="1">
+              <a:schemeClr val="accent1"/>
+            </a:effectRef>
+            <a:fontRef idx="minor">
+              <a:schemeClr val="tx1"/>
+            </a:fontRef>
+          </p:style>
+        </p:cxnSp>
+      </p:grpSp>
+      <p:grpSp>
+        <p:nvGrpSpPr>
+          <p:cNvPr id="39" name="Group 38">
+            <a:extLst>
+              <a:ext uri="{FF2B5EF4-FFF2-40B4-BE49-F238E27FC236}">
+                <a16:creationId xmlns:a16="http://schemas.microsoft.com/office/drawing/2014/main" id="{BE6BC586-DE66-C7D6-D9C7-F9F2A90CB1DB}"/>
+              </a:ext>
+            </a:extLst>
+          </p:cNvPr>
+          <p:cNvGrpSpPr/>
+          <p:nvPr/>
+        </p:nvGrpSpPr>
+        <p:grpSpPr>
+          <a:xfrm>
+            <a:off x="5015342" y="1787500"/>
+            <a:ext cx="2521650" cy="954482"/>
+            <a:chOff x="2012994" y="1041642"/>
+            <a:chExt cx="3004656" cy="1137306"/>
+          </a:xfrm>
+        </p:grpSpPr>
+        <p:cxnSp>
+          <p:nvCxnSpPr>
+            <p:cNvPr id="40" name="Straight Connector 39">
+              <a:extLst>
+                <a:ext uri="{FF2B5EF4-FFF2-40B4-BE49-F238E27FC236}">
+                  <a16:creationId xmlns:a16="http://schemas.microsoft.com/office/drawing/2014/main" id="{1F23C2E3-612F-F681-4866-77FF059FD82D}"/>
+                </a:ext>
+              </a:extLst>
+            </p:cNvPr>
+            <p:cNvCxnSpPr>
+              <a:cxnSpLocks/>
+            </p:cNvCxnSpPr>
+            <p:nvPr/>
+          </p:nvCxnSpPr>
+          <p:spPr>
+            <a:xfrm flipH="1" flipV="1">
+              <a:off x="3553096" y="1042279"/>
+              <a:ext cx="1464554" cy="1136669"/>
+            </a:xfrm>
+            <a:prstGeom prst="line">
+              <a:avLst/>
+            </a:prstGeom>
+            <a:ln w="38100" cap="rnd">
+              <a:solidFill>
+                <a:schemeClr val="bg1"/>
+              </a:solidFill>
+              <a:round/>
+            </a:ln>
+          </p:spPr>
+          <p:style>
+            <a:lnRef idx="2">
+              <a:schemeClr val="accent1"/>
+            </a:lnRef>
+            <a:fillRef idx="0">
+              <a:schemeClr val="accent1"/>
+            </a:fillRef>
+            <a:effectRef idx="1">
+              <a:schemeClr val="accent1"/>
+            </a:effectRef>
+            <a:fontRef idx="minor">
+              <a:schemeClr val="tx1"/>
+            </a:fontRef>
+          </p:style>
+        </p:cxnSp>
+        <p:cxnSp>
+          <p:nvCxnSpPr>
+            <p:cNvPr id="41" name="Straight Connector 40">
+              <a:extLst>
+                <a:ext uri="{FF2B5EF4-FFF2-40B4-BE49-F238E27FC236}">
+                  <a16:creationId xmlns:a16="http://schemas.microsoft.com/office/drawing/2014/main" id="{B250D81D-AE11-1E72-4DBB-74935BB656A2}"/>
+                </a:ext>
+              </a:extLst>
+            </p:cNvPr>
+            <p:cNvCxnSpPr>
+              <a:cxnSpLocks/>
+            </p:cNvCxnSpPr>
+            <p:nvPr/>
+          </p:nvCxnSpPr>
+          <p:spPr>
+            <a:xfrm flipH="1">
+              <a:off x="2012994" y="1041642"/>
+              <a:ext cx="1537658" cy="0"/>
+            </a:xfrm>
+            <a:prstGeom prst="line">
+              <a:avLst/>
+            </a:prstGeom>
+            <a:ln w="38100" cap="rnd">
+              <a:solidFill>
+                <a:schemeClr val="bg1"/>
+              </a:solidFill>
+              <a:round/>
+            </a:ln>
+          </p:spPr>
+          <p:style>
+            <a:lnRef idx="2">
+              <a:schemeClr val="accent1"/>
+            </a:lnRef>
+            <a:fillRef idx="0">
+              <a:schemeClr val="accent1"/>
+            </a:fillRef>
+            <a:effectRef idx="1">
+              <a:schemeClr val="accent1"/>
+            </a:effectRef>
+            <a:fontRef idx="minor">
+              <a:schemeClr val="tx1"/>
+            </a:fontRef>
+          </p:style>
+        </p:cxnSp>
+      </p:grpSp>
+    </p:spTree>
+    <p:extLst>
+      <p:ext uri="{BB962C8B-B14F-4D97-AF65-F5344CB8AC3E}">
+        <p14:creationId xmlns:p14="http://schemas.microsoft.com/office/powerpoint/2010/main" val="3304324998"/>
+      </p:ext>
+    </p:extLst>
+  </p:cSld>
+  <p:clrMapOvr>
+    <a:masterClrMapping/>
+  </p:clrMapOvr>
+</p:sld>
+</file>
+
+<file path=ppt/slides/slide24.xml><?xml version="1.0" encoding="utf-8"?>
+<p:sld xmlns:a="http://schemas.openxmlformats.org/drawingml/2006/main" xmlns:r="http://schemas.openxmlformats.org/officeDocument/2006/relationships" xmlns:p="http://schemas.openxmlformats.org/presentationml/2006/main">
+  <p:cSld>
+    <p:spTree>
+      <p:nvGrpSpPr>
+        <p:cNvPr id="1" name=""/>
+        <p:cNvGrpSpPr/>
+        <p:nvPr/>
+      </p:nvGrpSpPr>
+      <p:grpSpPr>
+        <a:xfrm>
+          <a:off x="0" y="0"/>
+          <a:ext cx="0" cy="0"/>
+          <a:chOff x="0" y="0"/>
+          <a:chExt cx="0" cy="0"/>
+        </a:xfrm>
+      </p:grpSpPr>
+      <p:pic>
+        <p:nvPicPr>
+          <p:cNvPr id="3" name="Graphic 2" descr="Car with solid fill">
+            <a:extLst>
+              <a:ext uri="{FF2B5EF4-FFF2-40B4-BE49-F238E27FC236}">
+                <a16:creationId xmlns:a16="http://schemas.microsoft.com/office/drawing/2014/main" id="{8736F8CF-7EF7-4662-AFF7-098DC00F6382}"/>
+              </a:ext>
+            </a:extLst>
+          </p:cNvPr>
+          <p:cNvPicPr>
+            <a:picLocks noChangeAspect="1"/>
+          </p:cNvPicPr>
+          <p:nvPr/>
+        </p:nvPicPr>
+        <p:blipFill>
+          <a:blip r:embed="rId2">
+            <a:extLst>
+              <a:ext uri="{28A0092B-C50C-407E-A947-70E740481C1C}">
+                <a14:useLocalDpi xmlns:a14="http://schemas.microsoft.com/office/drawing/2010/main" val="0"/>
+              </a:ext>
+              <a:ext uri="{96DAC541-7B7A-43D3-8B79-37D633B846F1}">
+                <asvg:svgBlip xmlns:asvg="http://schemas.microsoft.com/office/drawing/2016/SVG/main" r:embed="rId3"/>
+              </a:ext>
+            </a:extLst>
+          </a:blip>
+          <a:stretch>
+            <a:fillRect/>
+          </a:stretch>
+        </p:blipFill>
+        <p:spPr>
+          <a:xfrm>
+            <a:off x="845128" y="2355273"/>
+            <a:ext cx="4738254" cy="4738254"/>
+          </a:xfrm>
+          <a:prstGeom prst="rect">
+            <a:avLst/>
+          </a:prstGeom>
+        </p:spPr>
+      </p:pic>
+      <p:sp>
+        <p:nvSpPr>
+          <p:cNvPr id="4" name="TextBox 3">
+            <a:extLst>
+              <a:ext uri="{FF2B5EF4-FFF2-40B4-BE49-F238E27FC236}">
+                <a16:creationId xmlns:a16="http://schemas.microsoft.com/office/drawing/2014/main" id="{4CB60D67-9030-F3F7-4A11-BAFA027C69D1}"/>
+              </a:ext>
+            </a:extLst>
+          </p:cNvPr>
+          <p:cNvSpPr txBox="1"/>
+          <p:nvPr/>
+        </p:nvSpPr>
+        <p:spPr>
+          <a:xfrm>
+            <a:off x="748146" y="965261"/>
+            <a:ext cx="8298873" cy="1107996"/>
+          </a:xfrm>
+          <a:prstGeom prst="rect">
+            <a:avLst/>
+          </a:prstGeom>
+          <a:noFill/>
+        </p:spPr>
+        <p:txBody>
+          <a:bodyPr wrap="square" rtlCol="0">
+            <a:spAutoFit/>
+          </a:bodyPr>
+          <a:lstStyle/>
+          <a:p>
+            <a:pPr algn="ctr"/>
+            <a:r>
+              <a:rPr lang="en-US" sz="6600" dirty="0">
+                <a:solidFill>
+                  <a:srgbClr val="FF0000"/>
+                </a:solidFill>
+                <a:latin typeface="Century Gothic" panose="020B0502020202020204" pitchFamily="34" charset="0"/>
+              </a:rPr>
+              <a:t>DEAD-END-SUNRISE</a:t>
+            </a:r>
+            <a:endParaRPr lang="en-IN" sz="6600" dirty="0">
+              <a:solidFill>
+                <a:srgbClr val="FF0000"/>
+              </a:solidFill>
+              <a:latin typeface="Century Gothic" panose="020B0502020202020204" pitchFamily="34" charset="0"/>
+            </a:endParaRPr>
+          </a:p>
+        </p:txBody>
+      </p:sp>
+      <p:sp>
+        <p:nvSpPr>
+          <p:cNvPr id="5" name="TextBox 4">
+            <a:extLst>
+              <a:ext uri="{FF2B5EF4-FFF2-40B4-BE49-F238E27FC236}">
+                <a16:creationId xmlns:a16="http://schemas.microsoft.com/office/drawing/2014/main" id="{AD824EEF-8919-36E3-7DEF-82F28EE05E66}"/>
+              </a:ext>
+            </a:extLst>
+          </p:cNvPr>
+          <p:cNvSpPr txBox="1"/>
+          <p:nvPr/>
+        </p:nvSpPr>
+        <p:spPr>
+          <a:xfrm>
+            <a:off x="7564582" y="3419004"/>
+            <a:ext cx="2964873" cy="1077218"/>
+          </a:xfrm>
+          <a:prstGeom prst="rect">
+            <a:avLst/>
+          </a:prstGeom>
+          <a:noFill/>
+        </p:spPr>
+        <p:txBody>
+          <a:bodyPr wrap="square" rtlCol="0">
+            <a:spAutoFit/>
+          </a:bodyPr>
+          <a:lstStyle/>
+          <a:p>
+            <a:pPr algn="ctr"/>
+            <a:r>
+              <a:rPr lang="en-US" sz="3200" dirty="0">
+                <a:latin typeface="Century Gothic" panose="020B0502020202020204" pitchFamily="34" charset="0"/>
+              </a:rPr>
+              <a:t>Press “O” to START</a:t>
+            </a:r>
+            <a:endParaRPr lang="en-IN" sz="3200" dirty="0">
+              <a:latin typeface="Century Gothic" panose="020B0502020202020204" pitchFamily="34" charset="0"/>
+            </a:endParaRPr>
+          </a:p>
+        </p:txBody>
+      </p:sp>
+    </p:spTree>
+    <p:extLst>
+      <p:ext uri="{BB962C8B-B14F-4D97-AF65-F5344CB8AC3E}">
+        <p14:creationId xmlns:p14="http://schemas.microsoft.com/office/powerpoint/2010/main" val="245437243"/>
       </p:ext>
     </p:extLst>
   </p:cSld>
@@ -10563,4 +12195,319 @@
     </a:ext>
   </a:extLst>
 </a:theme>
+</file>
+
+<file path=ppt/theme/theme2.xml><?xml version="1.0" encoding="utf-8"?>
+<a:theme xmlns:a="http://schemas.openxmlformats.org/drawingml/2006/main" name="Office Theme">
+  <a:themeElements>
+    <a:clrScheme name="Office">
+      <a:dk1>
+        <a:sysClr val="windowText" lastClr="000000"/>
+      </a:dk1>
+      <a:lt1>
+        <a:sysClr val="window" lastClr="FFFFFF"/>
+      </a:lt1>
+      <a:dk2>
+        <a:srgbClr val="0E2841"/>
+      </a:dk2>
+      <a:lt2>
+        <a:srgbClr val="E8E8E8"/>
+      </a:lt2>
+      <a:accent1>
+        <a:srgbClr val="156082"/>
+      </a:accent1>
+      <a:accent2>
+        <a:srgbClr val="E97132"/>
+      </a:accent2>
+      <a:accent3>
+        <a:srgbClr val="196B24"/>
+      </a:accent3>
+      <a:accent4>
+        <a:srgbClr val="0F9ED5"/>
+      </a:accent4>
+      <a:accent5>
+        <a:srgbClr val="A02B93"/>
+      </a:accent5>
+      <a:accent6>
+        <a:srgbClr val="4EA72E"/>
+      </a:accent6>
+      <a:hlink>
+        <a:srgbClr val="467886"/>
+      </a:hlink>
+      <a:folHlink>
+        <a:srgbClr val="96607D"/>
+      </a:folHlink>
+    </a:clrScheme>
+    <a:fontScheme name="Office">
+      <a:majorFont>
+        <a:latin typeface="Aptos Display" panose="02110004020202020204"/>
+        <a:ea typeface=""/>
+        <a:cs typeface=""/>
+        <a:font script="Jpan" typeface="游ゴシック Light"/>
+        <a:font script="Hang" typeface="맑은 고딕"/>
+        <a:font script="Hans" typeface="等线 Light"/>
+        <a:font script="Hant" typeface="新細明體"/>
+        <a:font script="Arab" typeface="Times New Roman"/>
+        <a:font script="Hebr" typeface="Times New Roman"/>
+        <a:font script="Thai" typeface="Angsana New"/>
+        <a:font script="Ethi" typeface="Nyala"/>
+        <a:font script="Beng" typeface="Vrinda"/>
+        <a:font script="Gujr" typeface="Shruti"/>
+        <a:font script="Khmr" typeface="MoolBoran"/>
+        <a:font script="Knda" typeface="Tunga"/>
+        <a:font script="Guru" typeface="Raavi"/>
+        <a:font script="Cans" typeface="Euphemia"/>
+        <a:font script="Cher" typeface="Plantagenet Cherokee"/>
+        <a:font script="Yiii" typeface="Microsoft Yi Baiti"/>
+        <a:font script="Tibt" typeface="Microsoft Himalaya"/>
+        <a:font script="Thaa" typeface="MV Boli"/>
+        <a:font script="Deva" typeface="Mangal"/>
+        <a:font script="Telu" typeface="Gautami"/>
+        <a:font script="Taml" typeface="Latha"/>
+        <a:font script="Syrc" typeface="Estrangelo Edessa"/>
+        <a:font script="Orya" typeface="Kalinga"/>
+        <a:font script="Mlym" typeface="Kartika"/>
+        <a:font script="Laoo" typeface="DokChampa"/>
+        <a:font script="Sinh" typeface="Iskoola Pota"/>
+        <a:font script="Mong" typeface="Mongolian Baiti"/>
+        <a:font script="Viet" typeface="Times New Roman"/>
+        <a:font script="Uigh" typeface="Microsoft Uighur"/>
+        <a:font script="Geor" typeface="Sylfaen"/>
+        <a:font script="Armn" typeface="Arial"/>
+        <a:font script="Bugi" typeface="Leelawadee UI"/>
+        <a:font script="Bopo" typeface="Microsoft JhengHei"/>
+        <a:font script="Java" typeface="Javanese Text"/>
+        <a:font script="Lisu" typeface="Segoe UI"/>
+        <a:font script="Mymr" typeface="Myanmar Text"/>
+        <a:font script="Nkoo" typeface="Ebrima"/>
+        <a:font script="Olck" typeface="Nirmala UI"/>
+        <a:font script="Osma" typeface="Ebrima"/>
+        <a:font script="Phag" typeface="Phagspa"/>
+        <a:font script="Syrn" typeface="Estrangelo Edessa"/>
+        <a:font script="Syrj" typeface="Estrangelo Edessa"/>
+        <a:font script="Syre" typeface="Estrangelo Edessa"/>
+        <a:font script="Sora" typeface="Nirmala UI"/>
+        <a:font script="Tale" typeface="Microsoft Tai Le"/>
+        <a:font script="Talu" typeface="Microsoft New Tai Lue"/>
+        <a:font script="Tfng" typeface="Ebrima"/>
+      </a:majorFont>
+      <a:minorFont>
+        <a:latin typeface="Aptos" panose="02110004020202020204"/>
+        <a:ea typeface=""/>
+        <a:cs typeface=""/>
+        <a:font script="Jpan" typeface="游ゴシック"/>
+        <a:font script="Hang" typeface="맑은 고딕"/>
+        <a:font script="Hans" typeface="等线"/>
+        <a:font script="Hant" typeface="新細明體"/>
+        <a:font script="Arab" typeface="Arial"/>
+        <a:font script="Hebr" typeface="Arial"/>
+        <a:font script="Thai" typeface="Cordia New"/>
+        <a:font script="Ethi" typeface="Nyala"/>
+        <a:font script="Beng" typeface="Vrinda"/>
+        <a:font script="Gujr" typeface="Shruti"/>
+        <a:font script="Khmr" typeface="DaunPenh"/>
+        <a:font script="Knda" typeface="Tunga"/>
+        <a:font script="Guru" typeface="Raavi"/>
+        <a:font script="Cans" typeface="Euphemia"/>
+        <a:font script="Cher" typeface="Plantagenet Cherokee"/>
+        <a:font script="Yiii" typeface="Microsoft Yi Baiti"/>
+        <a:font script="Tibt" typeface="Microsoft Himalaya"/>
+        <a:font script="Thaa" typeface="MV Boli"/>
+        <a:font script="Deva" typeface="Mangal"/>
+        <a:font script="Telu" typeface="Gautami"/>
+        <a:font script="Taml" typeface="Latha"/>
+        <a:font script="Syrc" typeface="Estrangelo Edessa"/>
+        <a:font script="Orya" typeface="Kalinga"/>
+        <a:font script="Mlym" typeface="Kartika"/>
+        <a:font script="Laoo" typeface="DokChampa"/>
+        <a:font script="Sinh" typeface="Iskoola Pota"/>
+        <a:font script="Mong" typeface="Mongolian Baiti"/>
+        <a:font script="Viet" typeface="Arial"/>
+        <a:font script="Uigh" typeface="Microsoft Uighur"/>
+        <a:font script="Geor" typeface="Sylfaen"/>
+        <a:font script="Armn" typeface="Arial"/>
+        <a:font script="Bugi" typeface="Leelawadee UI"/>
+        <a:font script="Bopo" typeface="Microsoft JhengHei"/>
+        <a:font script="Java" typeface="Javanese Text"/>
+        <a:font script="Lisu" typeface="Segoe UI"/>
+        <a:font script="Mymr" typeface="Myanmar Text"/>
+        <a:font script="Nkoo" typeface="Ebrima"/>
+        <a:font script="Olck" typeface="Nirmala UI"/>
+        <a:font script="Osma" typeface="Ebrima"/>
+        <a:font script="Phag" typeface="Phagspa"/>
+        <a:font script="Syrn" typeface="Estrangelo Edessa"/>
+        <a:font script="Syrj" typeface="Estrangelo Edessa"/>
+        <a:font script="Syre" typeface="Estrangelo Edessa"/>
+        <a:font script="Sora" typeface="Nirmala UI"/>
+        <a:font script="Tale" typeface="Microsoft Tai Le"/>
+        <a:font script="Talu" typeface="Microsoft New Tai Lue"/>
+        <a:font script="Tfng" typeface="Ebrima"/>
+      </a:minorFont>
+    </a:fontScheme>
+    <a:fmtScheme name="Office">
+      <a:fillStyleLst>
+        <a:solidFill>
+          <a:schemeClr val="phClr"/>
+        </a:solidFill>
+        <a:gradFill rotWithShape="1">
+          <a:gsLst>
+            <a:gs pos="0">
+              <a:schemeClr val="phClr">
+                <a:lumMod val="110000"/>
+                <a:satMod val="105000"/>
+                <a:tint val="67000"/>
+              </a:schemeClr>
+            </a:gs>
+            <a:gs pos="50000">
+              <a:schemeClr val="phClr">
+                <a:lumMod val="105000"/>
+                <a:satMod val="103000"/>
+                <a:tint val="73000"/>
+              </a:schemeClr>
+            </a:gs>
+            <a:gs pos="100000">
+              <a:schemeClr val="phClr">
+                <a:lumMod val="105000"/>
+                <a:satMod val="109000"/>
+                <a:tint val="81000"/>
+              </a:schemeClr>
+            </a:gs>
+          </a:gsLst>
+          <a:lin ang="5400000" scaled="0"/>
+        </a:gradFill>
+        <a:gradFill rotWithShape="1">
+          <a:gsLst>
+            <a:gs pos="0">
+              <a:schemeClr val="phClr">
+                <a:satMod val="103000"/>
+                <a:lumMod val="102000"/>
+                <a:tint val="94000"/>
+              </a:schemeClr>
+            </a:gs>
+            <a:gs pos="50000">
+              <a:schemeClr val="phClr">
+                <a:satMod val="110000"/>
+                <a:lumMod val="100000"/>
+                <a:shade val="100000"/>
+              </a:schemeClr>
+            </a:gs>
+            <a:gs pos="100000">
+              <a:schemeClr val="phClr">
+                <a:lumMod val="99000"/>
+                <a:satMod val="120000"/>
+                <a:shade val="78000"/>
+              </a:schemeClr>
+            </a:gs>
+          </a:gsLst>
+          <a:lin ang="5400000" scaled="0"/>
+        </a:gradFill>
+      </a:fillStyleLst>
+      <a:lnStyleLst>
+        <a:ln w="12700" cap="flat" cmpd="sng" algn="ctr">
+          <a:solidFill>
+            <a:schemeClr val="phClr"/>
+          </a:solidFill>
+          <a:prstDash val="solid"/>
+          <a:miter lim="800000"/>
+        </a:ln>
+        <a:ln w="19050" cap="flat" cmpd="sng" algn="ctr">
+          <a:solidFill>
+            <a:schemeClr val="phClr"/>
+          </a:solidFill>
+          <a:prstDash val="solid"/>
+          <a:miter lim="800000"/>
+        </a:ln>
+        <a:ln w="25400" cap="flat" cmpd="sng" algn="ctr">
+          <a:solidFill>
+            <a:schemeClr val="phClr"/>
+          </a:solidFill>
+          <a:prstDash val="solid"/>
+          <a:miter lim="800000"/>
+        </a:ln>
+      </a:lnStyleLst>
+      <a:effectStyleLst>
+        <a:effectStyle>
+          <a:effectLst/>
+        </a:effectStyle>
+        <a:effectStyle>
+          <a:effectLst/>
+        </a:effectStyle>
+        <a:effectStyle>
+          <a:effectLst>
+            <a:outerShdw blurRad="57150" dist="19050" dir="5400000" algn="ctr" rotWithShape="0">
+              <a:srgbClr val="000000">
+                <a:alpha val="63000"/>
+              </a:srgbClr>
+            </a:outerShdw>
+          </a:effectLst>
+        </a:effectStyle>
+      </a:effectStyleLst>
+      <a:bgFillStyleLst>
+        <a:solidFill>
+          <a:schemeClr val="phClr"/>
+        </a:solidFill>
+        <a:solidFill>
+          <a:schemeClr val="phClr">
+            <a:tint val="95000"/>
+            <a:satMod val="170000"/>
+          </a:schemeClr>
+        </a:solidFill>
+        <a:gradFill rotWithShape="1">
+          <a:gsLst>
+            <a:gs pos="0">
+              <a:schemeClr val="phClr">
+                <a:tint val="93000"/>
+                <a:satMod val="150000"/>
+                <a:shade val="98000"/>
+                <a:lumMod val="102000"/>
+              </a:schemeClr>
+            </a:gs>
+            <a:gs pos="50000">
+              <a:schemeClr val="phClr">
+                <a:tint val="98000"/>
+                <a:satMod val="130000"/>
+                <a:shade val="90000"/>
+                <a:lumMod val="103000"/>
+              </a:schemeClr>
+            </a:gs>
+            <a:gs pos="100000">
+              <a:schemeClr val="phClr">
+                <a:shade val="63000"/>
+                <a:satMod val="120000"/>
+              </a:schemeClr>
+            </a:gs>
+          </a:gsLst>
+          <a:lin ang="5400000" scaled="0"/>
+        </a:gradFill>
+      </a:bgFillStyleLst>
+    </a:fmtScheme>
+  </a:themeElements>
+  <a:objectDefaults>
+    <a:lnDef>
+      <a:spPr/>
+      <a:bodyPr/>
+      <a:lstStyle/>
+      <a:style>
+        <a:lnRef idx="2">
+          <a:schemeClr val="accent1"/>
+        </a:lnRef>
+        <a:fillRef idx="0">
+          <a:schemeClr val="accent1"/>
+        </a:fillRef>
+        <a:effectRef idx="1">
+          <a:schemeClr val="accent1"/>
+        </a:effectRef>
+        <a:fontRef idx="minor">
+          <a:schemeClr val="tx1"/>
+        </a:fontRef>
+      </a:style>
+    </a:lnDef>
+  </a:objectDefaults>
+  <a:extraClrSchemeLst/>
+  <a:extLst>
+    <a:ext uri="{05A4C25C-085E-4340-85A3-A5531E510DB2}">
+      <thm15:themeFamily xmlns:thm15="http://schemas.microsoft.com/office/thememl/2012/main" name="Office Theme" id="{2E142A2C-CD16-42D6-873A-C26D2A0506FA}" vid="{1BDDFF52-6CD6-40A5-AB3C-68EB2F1E4D0A}"/>
+    </a:ext>
+  </a:extLst>
+</a:theme>
 </file>
</xml_diff>